<commit_message>
More documentation updates: Data Flow diagram
</commit_message>
<xml_diff>
--- a/documentation/media/illustrations.pptx
+++ b/documentation/media/illustrations.pptx
@@ -12,6 +12,7 @@
     <p:sldId id="261" r:id="rId6"/>
     <p:sldId id="260" r:id="rId7"/>
     <p:sldId id="262" r:id="rId8"/>
+    <p:sldId id="263" r:id="rId9"/>
   </p:sldIdLst>
   <p:sldSz cx="12192000" cy="6858000"/>
   <p:notesSz cx="6858000" cy="9144000"/>
@@ -118,6 +119,667 @@
 </p:presentation>
 </file>
 
+<file path=ppt/revisionInfo.xml><?xml version="1.0" encoding="utf-8"?>
+<p1510:revInfo xmlns:a="http://schemas.openxmlformats.org/drawingml/2006/main" xmlns:r="http://schemas.openxmlformats.org/officeDocument/2006/relationships" xmlns:p1510="http://schemas.microsoft.com/office/powerpoint/2015/10/main">
+  <p1510:revLst>
+    <p1510:client id="{E7039326-52F2-4C17-82F9-14CED7EEAEB2}" v="734" dt="2018-09-08T11:28:59.422"/>
+  </p1510:revLst>
+</p1510:revInfo>
+</file>
+
+<file path=ppt/changesInfos/changesInfo1.xml><?xml version="1.0" encoding="utf-8"?>
+<pc:chgInfo xmlns:a="http://schemas.openxmlformats.org/drawingml/2006/main" xmlns:r="http://schemas.openxmlformats.org/officeDocument/2006/relationships" xmlns:ac="http://schemas.microsoft.com/office/drawing/2013/main/command" xmlns:pc="http://schemas.microsoft.com/office/powerpoint/2013/main/command">
+  <pc:docChgLst>
+    <pc:chgData name="Khaled Hikmat" userId="6eb524be913898f5" providerId="LiveId" clId="{E7039326-52F2-4C17-82F9-14CED7EEAEB2}"/>
+    <pc:docChg chg="undo custSel addSld modSld">
+      <pc:chgData name="Khaled Hikmat" userId="6eb524be913898f5" providerId="LiveId" clId="{E7039326-52F2-4C17-82F9-14CED7EEAEB2}" dt="2018-09-08T11:28:59.422" v="731" actId="1076"/>
+      <pc:docMkLst>
+        <pc:docMk/>
+      </pc:docMkLst>
+      <pc:sldChg chg="addSp delSp modSp add">
+        <pc:chgData name="Khaled Hikmat" userId="6eb524be913898f5" providerId="LiveId" clId="{E7039326-52F2-4C17-82F9-14CED7EEAEB2}" dt="2018-09-08T11:28:59.422" v="731" actId="1076"/>
+        <pc:sldMkLst>
+          <pc:docMk/>
+          <pc:sldMk cId="2547119592" sldId="263"/>
+        </pc:sldMkLst>
+        <pc:spChg chg="add mod">
+          <ac:chgData name="Khaled Hikmat" userId="6eb524be913898f5" providerId="LiveId" clId="{E7039326-52F2-4C17-82F9-14CED7EEAEB2}" dt="2018-09-08T11:17:13.902" v="700" actId="1035"/>
+          <ac:spMkLst>
+            <pc:docMk/>
+            <pc:sldMk cId="2547119592" sldId="263"/>
+            <ac:spMk id="2" creationId="{A4C3FAC5-6374-436A-B019-378AA525E3A0}"/>
+          </ac:spMkLst>
+        </pc:spChg>
+        <pc:spChg chg="add mod">
+          <ac:chgData name="Khaled Hikmat" userId="6eb524be913898f5" providerId="LiveId" clId="{E7039326-52F2-4C17-82F9-14CED7EEAEB2}" dt="2018-09-08T09:33:54.592" v="445" actId="1035"/>
+          <ac:spMkLst>
+            <pc:docMk/>
+            <pc:sldMk cId="2547119592" sldId="263"/>
+            <ac:spMk id="6" creationId="{4E946830-3A83-4DEB-B29E-88DA2BE22E7D}"/>
+          </ac:spMkLst>
+        </pc:spChg>
+        <pc:spChg chg="add mod">
+          <ac:chgData name="Khaled Hikmat" userId="6eb524be913898f5" providerId="LiveId" clId="{E7039326-52F2-4C17-82F9-14CED7EEAEB2}" dt="2018-09-08T09:33:54.592" v="445" actId="1035"/>
+          <ac:spMkLst>
+            <pc:docMk/>
+            <pc:sldMk cId="2547119592" sldId="263"/>
+            <ac:spMk id="11" creationId="{E418794F-A7D6-4E60-9C79-68351EA445E9}"/>
+          </ac:spMkLst>
+        </pc:spChg>
+        <pc:spChg chg="add mod">
+          <ac:chgData name="Khaled Hikmat" userId="6eb524be913898f5" providerId="LiveId" clId="{E7039326-52F2-4C17-82F9-14CED7EEAEB2}" dt="2018-09-08T11:17:50.402" v="703" actId="1035"/>
+          <ac:spMkLst>
+            <pc:docMk/>
+            <pc:sldMk cId="2547119592" sldId="263"/>
+            <ac:spMk id="15" creationId="{5DC54626-E07B-4327-8D20-77066B8D2106}"/>
+          </ac:spMkLst>
+        </pc:spChg>
+        <pc:spChg chg="add del mod">
+          <ac:chgData name="Khaled Hikmat" userId="6eb524be913898f5" providerId="LiveId" clId="{E7039326-52F2-4C17-82F9-14CED7EEAEB2}" dt="2018-09-08T09:52:41.445" v="569" actId="478"/>
+          <ac:spMkLst>
+            <pc:docMk/>
+            <pc:sldMk cId="2547119592" sldId="263"/>
+            <ac:spMk id="20" creationId="{62E85A7A-4950-4FB8-A2A1-6535836E5E3E}"/>
+          </ac:spMkLst>
+        </pc:spChg>
+        <pc:spChg chg="add mod">
+          <ac:chgData name="Khaled Hikmat" userId="6eb524be913898f5" providerId="LiveId" clId="{E7039326-52F2-4C17-82F9-14CED7EEAEB2}" dt="2018-09-08T10:06:47.700" v="675" actId="554"/>
+          <ac:spMkLst>
+            <pc:docMk/>
+            <pc:sldMk cId="2547119592" sldId="263"/>
+            <ac:spMk id="22" creationId="{A8B5718A-2C4D-4AC9-9697-835F284B5CC3}"/>
+          </ac:spMkLst>
+        </pc:spChg>
+        <pc:spChg chg="add del mod">
+          <ac:chgData name="Khaled Hikmat" userId="6eb524be913898f5" providerId="LiveId" clId="{E7039326-52F2-4C17-82F9-14CED7EEAEB2}" dt="2018-09-08T09:50:15.707" v="494" actId="478"/>
+          <ac:spMkLst>
+            <pc:docMk/>
+            <pc:sldMk cId="2547119592" sldId="263"/>
+            <ac:spMk id="29" creationId="{E6A87331-162A-4135-B657-CE7DE9C45838}"/>
+          </ac:spMkLst>
+        </pc:spChg>
+        <pc:spChg chg="add del mod">
+          <ac:chgData name="Khaled Hikmat" userId="6eb524be913898f5" providerId="LiveId" clId="{E7039326-52F2-4C17-82F9-14CED7EEAEB2}" dt="2018-09-08T09:52:00.856" v="560" actId="478"/>
+          <ac:spMkLst>
+            <pc:docMk/>
+            <pc:sldMk cId="2547119592" sldId="263"/>
+            <ac:spMk id="34" creationId="{362C0845-053E-4073-B268-3E87C8587177}"/>
+          </ac:spMkLst>
+        </pc:spChg>
+        <pc:spChg chg="add mod">
+          <ac:chgData name="Khaled Hikmat" userId="6eb524be913898f5" providerId="LiveId" clId="{E7039326-52F2-4C17-82F9-14CED7EEAEB2}" dt="2018-09-08T09:24:59.680" v="227" actId="571"/>
+          <ac:spMkLst>
+            <pc:docMk/>
+            <pc:sldMk cId="2547119592" sldId="263"/>
+            <ac:spMk id="37" creationId="{73164A33-80E5-417C-9656-4C5974B9722C}"/>
+          </ac:spMkLst>
+        </pc:spChg>
+        <pc:spChg chg="add mod">
+          <ac:chgData name="Khaled Hikmat" userId="6eb524be913898f5" providerId="LiveId" clId="{E7039326-52F2-4C17-82F9-14CED7EEAEB2}" dt="2018-09-08T09:33:54.592" v="445" actId="1035"/>
+          <ac:spMkLst>
+            <pc:docMk/>
+            <pc:sldMk cId="2547119592" sldId="263"/>
+            <ac:spMk id="39" creationId="{79D54F6B-2F00-4957-9C51-A2A039CA55F5}"/>
+          </ac:spMkLst>
+        </pc:spChg>
+        <pc:spChg chg="add del">
+          <ac:chgData name="Khaled Hikmat" userId="6eb524be913898f5" providerId="LiveId" clId="{E7039326-52F2-4C17-82F9-14CED7EEAEB2}" dt="2018-09-08T09:25:51.804" v="231"/>
+          <ac:spMkLst>
+            <pc:docMk/>
+            <pc:sldMk cId="2547119592" sldId="263"/>
+            <ac:spMk id="43" creationId="{928B3461-9AE8-4ADA-9E2A-3A195D014B8D}"/>
+          </ac:spMkLst>
+        </pc:spChg>
+        <pc:spChg chg="add mod">
+          <ac:chgData name="Khaled Hikmat" userId="6eb524be913898f5" providerId="LiveId" clId="{E7039326-52F2-4C17-82F9-14CED7EEAEB2}" dt="2018-09-08T09:47:21.947" v="463" actId="207"/>
+          <ac:spMkLst>
+            <pc:docMk/>
+            <pc:sldMk cId="2547119592" sldId="263"/>
+            <ac:spMk id="47" creationId="{654B87CC-0DB4-474F-B488-55D92BE2D483}"/>
+          </ac:spMkLst>
+        </pc:spChg>
+        <pc:spChg chg="add del">
+          <ac:chgData name="Khaled Hikmat" userId="6eb524be913898f5" providerId="LiveId" clId="{E7039326-52F2-4C17-82F9-14CED7EEAEB2}" dt="2018-09-08T09:26:50.060" v="266" actId="478"/>
+          <ac:spMkLst>
+            <pc:docMk/>
+            <pc:sldMk cId="2547119592" sldId="263"/>
+            <ac:spMk id="48" creationId="{5BDF3DC1-58DE-4A10-81D2-6B2917E779DF}"/>
+          </ac:spMkLst>
+        </pc:spChg>
+        <pc:spChg chg="add mod">
+          <ac:chgData name="Khaled Hikmat" userId="6eb524be913898f5" providerId="LiveId" clId="{E7039326-52F2-4C17-82F9-14CED7EEAEB2}" dt="2018-09-08T10:14:18.150" v="686" actId="20577"/>
+          <ac:spMkLst>
+            <pc:docMk/>
+            <pc:sldMk cId="2547119592" sldId="263"/>
+            <ac:spMk id="49" creationId="{C769A4FF-3FB7-4160-BC4C-03A88D991591}"/>
+          </ac:spMkLst>
+        </pc:spChg>
+        <pc:spChg chg="add mod">
+          <ac:chgData name="Khaled Hikmat" userId="6eb524be913898f5" providerId="LiveId" clId="{E7039326-52F2-4C17-82F9-14CED7EEAEB2}" dt="2018-09-08T10:14:23.108" v="696" actId="20577"/>
+          <ac:spMkLst>
+            <pc:docMk/>
+            <pc:sldMk cId="2547119592" sldId="263"/>
+            <ac:spMk id="50" creationId="{02CC22E0-26E2-4377-8C2D-36B359CC48F8}"/>
+          </ac:spMkLst>
+        </pc:spChg>
+        <pc:spChg chg="add mod">
+          <ac:chgData name="Khaled Hikmat" userId="6eb524be913898f5" providerId="LiveId" clId="{E7039326-52F2-4C17-82F9-14CED7EEAEB2}" dt="2018-09-08T09:57:53.145" v="643" actId="1035"/>
+          <ac:spMkLst>
+            <pc:docMk/>
+            <pc:sldMk cId="2547119592" sldId="263"/>
+            <ac:spMk id="51" creationId="{9CD94937-464E-4804-9887-6FD9C8567A39}"/>
+          </ac:spMkLst>
+        </pc:spChg>
+        <pc:spChg chg="add mod ord">
+          <ac:chgData name="Khaled Hikmat" userId="6eb524be913898f5" providerId="LiveId" clId="{E7039326-52F2-4C17-82F9-14CED7EEAEB2}" dt="2018-09-08T10:06:47.700" v="675" actId="554"/>
+          <ac:spMkLst>
+            <pc:docMk/>
+            <pc:sldMk cId="2547119592" sldId="263"/>
+            <ac:spMk id="55" creationId="{7B13606B-16DA-4E7D-9356-1DB11770EFFC}"/>
+          </ac:spMkLst>
+        </pc:spChg>
+        <pc:spChg chg="add mod ord">
+          <ac:chgData name="Khaled Hikmat" userId="6eb524be913898f5" providerId="LiveId" clId="{E7039326-52F2-4C17-82F9-14CED7EEAEB2}" dt="2018-09-08T10:06:47.700" v="675" actId="554"/>
+          <ac:spMkLst>
+            <pc:docMk/>
+            <pc:sldMk cId="2547119592" sldId="263"/>
+            <ac:spMk id="57" creationId="{118814E0-44F0-4428-965F-779C72F728AF}"/>
+          </ac:spMkLst>
+        </pc:spChg>
+        <pc:spChg chg="add mod">
+          <ac:chgData name="Khaled Hikmat" userId="6eb524be913898f5" providerId="LiveId" clId="{E7039326-52F2-4C17-82F9-14CED7EEAEB2}" dt="2018-09-08T10:06:47.700" v="675" actId="554"/>
+          <ac:spMkLst>
+            <pc:docMk/>
+            <pc:sldMk cId="2547119592" sldId="263"/>
+            <ac:spMk id="62" creationId="{D479E31F-6002-4AB2-8260-1EDA9DFA1853}"/>
+          </ac:spMkLst>
+        </pc:spChg>
+        <pc:spChg chg="add mod">
+          <ac:chgData name="Khaled Hikmat" userId="6eb524be913898f5" providerId="LiveId" clId="{E7039326-52F2-4C17-82F9-14CED7EEAEB2}" dt="2018-09-08T09:55:23.877" v="636" actId="554"/>
+          <ac:spMkLst>
+            <pc:docMk/>
+            <pc:sldMk cId="2547119592" sldId="263"/>
+            <ac:spMk id="71" creationId="{0F28C666-5D19-4D58-B11C-181DE162A30C}"/>
+          </ac:spMkLst>
+        </pc:spChg>
+        <pc:spChg chg="add mod">
+          <ac:chgData name="Khaled Hikmat" userId="6eb524be913898f5" providerId="LiveId" clId="{E7039326-52F2-4C17-82F9-14CED7EEAEB2}" dt="2018-09-08T09:55:23.877" v="636" actId="554"/>
+          <ac:spMkLst>
+            <pc:docMk/>
+            <pc:sldMk cId="2547119592" sldId="263"/>
+            <ac:spMk id="72" creationId="{BDD3024D-01A7-4A82-8932-92570EAE8791}"/>
+          </ac:spMkLst>
+        </pc:spChg>
+        <pc:spChg chg="add mod">
+          <ac:chgData name="Khaled Hikmat" userId="6eb524be913898f5" providerId="LiveId" clId="{E7039326-52F2-4C17-82F9-14CED7EEAEB2}" dt="2018-09-08T09:55:23.877" v="636" actId="554"/>
+          <ac:spMkLst>
+            <pc:docMk/>
+            <pc:sldMk cId="2547119592" sldId="263"/>
+            <ac:spMk id="73" creationId="{B07F96C0-52DF-4E67-AC1E-E70A48378B6D}"/>
+          </ac:spMkLst>
+        </pc:spChg>
+        <pc:spChg chg="add mod">
+          <ac:chgData name="Khaled Hikmat" userId="6eb524be913898f5" providerId="LiveId" clId="{E7039326-52F2-4C17-82F9-14CED7EEAEB2}" dt="2018-09-08T09:55:23.877" v="636" actId="554"/>
+          <ac:spMkLst>
+            <pc:docMk/>
+            <pc:sldMk cId="2547119592" sldId="263"/>
+            <ac:spMk id="74" creationId="{59DEC83B-AE64-4248-9AD1-49F3FE6DCF8B}"/>
+          </ac:spMkLst>
+        </pc:spChg>
+        <pc:picChg chg="add mod">
+          <ac:chgData name="Khaled Hikmat" userId="6eb524be913898f5" providerId="LiveId" clId="{E7039326-52F2-4C17-82F9-14CED7EEAEB2}" dt="2018-09-08T09:33:54.592" v="445" actId="1035"/>
+          <ac:picMkLst>
+            <pc:docMk/>
+            <pc:sldMk cId="2547119592" sldId="263"/>
+            <ac:picMk id="4" creationId="{4D9CADDD-610F-4F7B-8BEC-517B1651C5DF}"/>
+          </ac:picMkLst>
+        </pc:picChg>
+        <pc:picChg chg="add mod">
+          <ac:chgData name="Khaled Hikmat" userId="6eb524be913898f5" providerId="LiveId" clId="{E7039326-52F2-4C17-82F9-14CED7EEAEB2}" dt="2018-09-08T09:33:54.592" v="445" actId="1035"/>
+          <ac:picMkLst>
+            <pc:docMk/>
+            <pc:sldMk cId="2547119592" sldId="263"/>
+            <ac:picMk id="5" creationId="{494D0774-E9A7-472E-9541-8DDFEDC4FF98}"/>
+          </ac:picMkLst>
+        </pc:picChg>
+        <pc:picChg chg="add mod">
+          <ac:chgData name="Khaled Hikmat" userId="6eb524be913898f5" providerId="LiveId" clId="{E7039326-52F2-4C17-82F9-14CED7EEAEB2}" dt="2018-09-08T09:33:54.592" v="445" actId="1035"/>
+          <ac:picMkLst>
+            <pc:docMk/>
+            <pc:sldMk cId="2547119592" sldId="263"/>
+            <ac:picMk id="7" creationId="{B9B10F0C-5881-451B-A414-E138E409573F}"/>
+          </ac:picMkLst>
+        </pc:picChg>
+        <pc:picChg chg="add mod">
+          <ac:chgData name="Khaled Hikmat" userId="6eb524be913898f5" providerId="LiveId" clId="{E7039326-52F2-4C17-82F9-14CED7EEAEB2}" dt="2018-09-08T09:33:54.592" v="445" actId="1035"/>
+          <ac:picMkLst>
+            <pc:docMk/>
+            <pc:sldMk cId="2547119592" sldId="263"/>
+            <ac:picMk id="8" creationId="{BCE7F492-CAA8-47E4-81AC-E456E4256365}"/>
+          </ac:picMkLst>
+        </pc:picChg>
+        <pc:picChg chg="add mod">
+          <ac:chgData name="Khaled Hikmat" userId="6eb524be913898f5" providerId="LiveId" clId="{E7039326-52F2-4C17-82F9-14CED7EEAEB2}" dt="2018-09-08T09:33:54.592" v="445" actId="1035"/>
+          <ac:picMkLst>
+            <pc:docMk/>
+            <pc:sldMk cId="2547119592" sldId="263"/>
+            <ac:picMk id="10" creationId="{5F6853CF-E321-4AA2-888C-E3E95BB9D98E}"/>
+          </ac:picMkLst>
+        </pc:picChg>
+        <pc:picChg chg="add mod">
+          <ac:chgData name="Khaled Hikmat" userId="6eb524be913898f5" providerId="LiveId" clId="{E7039326-52F2-4C17-82F9-14CED7EEAEB2}" dt="2018-09-08T09:33:54.592" v="445" actId="1035"/>
+          <ac:picMkLst>
+            <pc:docMk/>
+            <pc:sldMk cId="2547119592" sldId="263"/>
+            <ac:picMk id="12" creationId="{0B7B7EA5-83D6-4661-AA3E-9EC2B67F123F}"/>
+          </ac:picMkLst>
+        </pc:picChg>
+        <pc:picChg chg="add mod">
+          <ac:chgData name="Khaled Hikmat" userId="6eb524be913898f5" providerId="LiveId" clId="{E7039326-52F2-4C17-82F9-14CED7EEAEB2}" dt="2018-09-08T09:33:54.592" v="445" actId="1035"/>
+          <ac:picMkLst>
+            <pc:docMk/>
+            <pc:sldMk cId="2547119592" sldId="263"/>
+            <ac:picMk id="13" creationId="{E6F85EB2-91B5-4137-B2AF-4E73FEA21FCA}"/>
+          </ac:picMkLst>
+        </pc:picChg>
+        <pc:picChg chg="add mod">
+          <ac:chgData name="Khaled Hikmat" userId="6eb524be913898f5" providerId="LiveId" clId="{E7039326-52F2-4C17-82F9-14CED7EEAEB2}" dt="2018-09-08T09:33:54.592" v="445" actId="1035"/>
+          <ac:picMkLst>
+            <pc:docMk/>
+            <pc:sldMk cId="2547119592" sldId="263"/>
+            <ac:picMk id="14" creationId="{06D1BABB-3FCD-4B63-9E32-5A522C05D828}"/>
+          </ac:picMkLst>
+        </pc:picChg>
+        <pc:picChg chg="add mod">
+          <ac:chgData name="Khaled Hikmat" userId="6eb524be913898f5" providerId="LiveId" clId="{E7039326-52F2-4C17-82F9-14CED7EEAEB2}" dt="2018-09-08T09:57:53.145" v="643" actId="1035"/>
+          <ac:picMkLst>
+            <pc:docMk/>
+            <pc:sldMk cId="2547119592" sldId="263"/>
+            <ac:picMk id="16" creationId="{72E93150-C282-4F44-AB5C-16CDB5B6DF4C}"/>
+          </ac:picMkLst>
+        </pc:picChg>
+        <pc:picChg chg="add del mod">
+          <ac:chgData name="Khaled Hikmat" userId="6eb524be913898f5" providerId="LiveId" clId="{E7039326-52F2-4C17-82F9-14CED7EEAEB2}" dt="2018-09-08T09:19:49.905" v="105" actId="478"/>
+          <ac:picMkLst>
+            <pc:docMk/>
+            <pc:sldMk cId="2547119592" sldId="263"/>
+            <ac:picMk id="17" creationId="{4605F0ED-81FE-4214-9F24-100EB5105BAE}"/>
+          </ac:picMkLst>
+        </pc:picChg>
+        <pc:picChg chg="add mod">
+          <ac:chgData name="Khaled Hikmat" userId="6eb524be913898f5" providerId="LiveId" clId="{E7039326-52F2-4C17-82F9-14CED7EEAEB2}" dt="2018-09-08T09:57:53.145" v="643" actId="1035"/>
+          <ac:picMkLst>
+            <pc:docMk/>
+            <pc:sldMk cId="2547119592" sldId="263"/>
+            <ac:picMk id="18" creationId="{EB895E9D-BD00-47FA-85B9-3A8F4089C7E7}"/>
+          </ac:picMkLst>
+        </pc:picChg>
+        <pc:picChg chg="add mod">
+          <ac:chgData name="Khaled Hikmat" userId="6eb524be913898f5" providerId="LiveId" clId="{E7039326-52F2-4C17-82F9-14CED7EEAEB2}" dt="2018-09-08T10:05:23.731" v="667" actId="1035"/>
+          <ac:picMkLst>
+            <pc:docMk/>
+            <pc:sldMk cId="2547119592" sldId="263"/>
+            <ac:picMk id="19" creationId="{E27EC875-55FB-49CF-969C-9098EF5F151D}"/>
+          </ac:picMkLst>
+        </pc:picChg>
+        <pc:picChg chg="add del mod">
+          <ac:chgData name="Khaled Hikmat" userId="6eb524be913898f5" providerId="LiveId" clId="{E7039326-52F2-4C17-82F9-14CED7EEAEB2}" dt="2018-09-08T09:52:41.445" v="569" actId="478"/>
+          <ac:picMkLst>
+            <pc:docMk/>
+            <pc:sldMk cId="2547119592" sldId="263"/>
+            <ac:picMk id="21" creationId="{581A1D52-CB6B-4F42-B95D-4520811D9F06}"/>
+          </ac:picMkLst>
+        </pc:picChg>
+        <pc:picChg chg="add mod">
+          <ac:chgData name="Khaled Hikmat" userId="6eb524be913898f5" providerId="LiveId" clId="{E7039326-52F2-4C17-82F9-14CED7EEAEB2}" dt="2018-09-08T09:52:18.634" v="562" actId="1076"/>
+          <ac:picMkLst>
+            <pc:docMk/>
+            <pc:sldMk cId="2547119592" sldId="263"/>
+            <ac:picMk id="23" creationId="{BCE23D8A-4916-4D3A-9A2B-0263C8889806}"/>
+          </ac:picMkLst>
+        </pc:picChg>
+        <pc:picChg chg="add del mod">
+          <ac:chgData name="Khaled Hikmat" userId="6eb524be913898f5" providerId="LiveId" clId="{E7039326-52F2-4C17-82F9-14CED7EEAEB2}" dt="2018-09-08T09:32:39.740" v="417" actId="478"/>
+          <ac:picMkLst>
+            <pc:docMk/>
+            <pc:sldMk cId="2547119592" sldId="263"/>
+            <ac:picMk id="25" creationId="{EB67F6F9-B873-4743-A97E-02FE88D157C3}"/>
+          </ac:picMkLst>
+        </pc:picChg>
+        <pc:picChg chg="add mod">
+          <ac:chgData name="Khaled Hikmat" userId="6eb524be913898f5" providerId="LiveId" clId="{E7039326-52F2-4C17-82F9-14CED7EEAEB2}" dt="2018-09-08T09:57:53.145" v="643" actId="1035"/>
+          <ac:picMkLst>
+            <pc:docMk/>
+            <pc:sldMk cId="2547119592" sldId="263"/>
+            <ac:picMk id="27" creationId="{07890601-3EBB-4033-8800-8F083795EEC1}"/>
+          </ac:picMkLst>
+        </pc:picChg>
+        <pc:picChg chg="add del mod">
+          <ac:chgData name="Khaled Hikmat" userId="6eb524be913898f5" providerId="LiveId" clId="{E7039326-52F2-4C17-82F9-14CED7EEAEB2}" dt="2018-09-08T11:28:41.749" v="727" actId="478"/>
+          <ac:picMkLst>
+            <pc:docMk/>
+            <pc:sldMk cId="2547119592" sldId="263"/>
+            <ac:picMk id="28" creationId="{31ABBE86-80CC-492E-8E48-E8C74FE3B376}"/>
+          </ac:picMkLst>
+        </pc:picChg>
+        <pc:picChg chg="add mod">
+          <ac:chgData name="Khaled Hikmat" userId="6eb524be913898f5" providerId="LiveId" clId="{E7039326-52F2-4C17-82F9-14CED7EEAEB2}" dt="2018-09-08T09:52:55.287" v="571" actId="1076"/>
+          <ac:picMkLst>
+            <pc:docMk/>
+            <pc:sldMk cId="2547119592" sldId="263"/>
+            <ac:picMk id="30" creationId="{4E663854-43A8-4DC5-B1B6-E3FAC90ECAD9}"/>
+          </ac:picMkLst>
+        </pc:picChg>
+        <pc:picChg chg="add del mod">
+          <ac:chgData name="Khaled Hikmat" userId="6eb524be913898f5" providerId="LiveId" clId="{E7039326-52F2-4C17-82F9-14CED7EEAEB2}" dt="2018-09-08T09:53:31.726" v="576" actId="478"/>
+          <ac:picMkLst>
+            <pc:docMk/>
+            <pc:sldMk cId="2547119592" sldId="263"/>
+            <ac:picMk id="31" creationId="{4A4981A3-14D9-4041-AD82-114B9DBDF122}"/>
+          </ac:picMkLst>
+        </pc:picChg>
+        <pc:picChg chg="add del mod">
+          <ac:chgData name="Khaled Hikmat" userId="6eb524be913898f5" providerId="LiveId" clId="{E7039326-52F2-4C17-82F9-14CED7EEAEB2}" dt="2018-09-08T09:53:32.734" v="577" actId="478"/>
+          <ac:picMkLst>
+            <pc:docMk/>
+            <pc:sldMk cId="2547119592" sldId="263"/>
+            <ac:picMk id="33" creationId="{C8B64B2F-CC9A-49D4-9275-5631D122F805}"/>
+          </ac:picMkLst>
+        </pc:picChg>
+        <pc:picChg chg="add del mod">
+          <ac:chgData name="Khaled Hikmat" userId="6eb524be913898f5" providerId="LiveId" clId="{E7039326-52F2-4C17-82F9-14CED7EEAEB2}" dt="2018-09-08T09:52:00.856" v="560" actId="478"/>
+          <ac:picMkLst>
+            <pc:docMk/>
+            <pc:sldMk cId="2547119592" sldId="263"/>
+            <ac:picMk id="35" creationId="{30BE33A9-03EC-4914-97FF-91B4DCB43CB6}"/>
+          </ac:picMkLst>
+        </pc:picChg>
+        <pc:picChg chg="add del mod">
+          <ac:chgData name="Khaled Hikmat" userId="6eb524be913898f5" providerId="LiveId" clId="{E7039326-52F2-4C17-82F9-14CED7EEAEB2}" dt="2018-09-08T09:53:34.382" v="578" actId="478"/>
+          <ac:picMkLst>
+            <pc:docMk/>
+            <pc:sldMk cId="2547119592" sldId="263"/>
+            <ac:picMk id="36" creationId="{8755FA1C-EA9C-482A-8F60-2E79461B5B58}"/>
+          </ac:picMkLst>
+        </pc:picChg>
+        <pc:picChg chg="add mod">
+          <ac:chgData name="Khaled Hikmat" userId="6eb524be913898f5" providerId="LiveId" clId="{E7039326-52F2-4C17-82F9-14CED7EEAEB2}" dt="2018-09-08T09:24:59.680" v="227" actId="571"/>
+          <ac:picMkLst>
+            <pc:docMk/>
+            <pc:sldMk cId="2547119592" sldId="263"/>
+            <ac:picMk id="38" creationId="{1EDB67A4-E5CA-4918-BDF3-E5C14AA9D08B}"/>
+          </ac:picMkLst>
+        </pc:picChg>
+        <pc:picChg chg="add mod">
+          <ac:chgData name="Khaled Hikmat" userId="6eb524be913898f5" providerId="LiveId" clId="{E7039326-52F2-4C17-82F9-14CED7EEAEB2}" dt="2018-09-08T09:33:54.592" v="445" actId="1035"/>
+          <ac:picMkLst>
+            <pc:docMk/>
+            <pc:sldMk cId="2547119592" sldId="263"/>
+            <ac:picMk id="40" creationId="{1FD04BA0-4642-4B93-AA93-913D8E3B1239}"/>
+          </ac:picMkLst>
+        </pc:picChg>
+        <pc:picChg chg="add mod">
+          <ac:chgData name="Khaled Hikmat" userId="6eb524be913898f5" providerId="LiveId" clId="{E7039326-52F2-4C17-82F9-14CED7EEAEB2}" dt="2018-09-08T09:33:54.592" v="445" actId="1035"/>
+          <ac:picMkLst>
+            <pc:docMk/>
+            <pc:sldMk cId="2547119592" sldId="263"/>
+            <ac:picMk id="41" creationId="{9E4FC6EA-A10C-48CF-9B11-3B61D3214E0B}"/>
+          </ac:picMkLst>
+        </pc:picChg>
+        <pc:picChg chg="add mod">
+          <ac:chgData name="Khaled Hikmat" userId="6eb524be913898f5" providerId="LiveId" clId="{E7039326-52F2-4C17-82F9-14CED7EEAEB2}" dt="2018-09-08T09:33:54.592" v="445" actId="1035"/>
+          <ac:picMkLst>
+            <pc:docMk/>
+            <pc:sldMk cId="2547119592" sldId="263"/>
+            <ac:picMk id="42" creationId="{69AD8C5C-55DB-4260-95C4-9FFF17702F27}"/>
+          </ac:picMkLst>
+        </pc:picChg>
+        <pc:picChg chg="add del">
+          <ac:chgData name="Khaled Hikmat" userId="6eb524be913898f5" providerId="LiveId" clId="{E7039326-52F2-4C17-82F9-14CED7EEAEB2}" dt="2018-09-08T09:25:51.804" v="231"/>
+          <ac:picMkLst>
+            <pc:docMk/>
+            <pc:sldMk cId="2547119592" sldId="263"/>
+            <ac:picMk id="44" creationId="{2AC9C078-6246-4C3B-915E-D9B8BB79EAFC}"/>
+          </ac:picMkLst>
+        </pc:picChg>
+        <pc:picChg chg="add del">
+          <ac:chgData name="Khaled Hikmat" userId="6eb524be913898f5" providerId="LiveId" clId="{E7039326-52F2-4C17-82F9-14CED7EEAEB2}" dt="2018-09-08T09:25:51.804" v="231"/>
+          <ac:picMkLst>
+            <pc:docMk/>
+            <pc:sldMk cId="2547119592" sldId="263"/>
+            <ac:picMk id="45" creationId="{2AF45669-97BF-4B21-AA3F-66296DA15299}"/>
+          </ac:picMkLst>
+        </pc:picChg>
+        <pc:picChg chg="add del">
+          <ac:chgData name="Khaled Hikmat" userId="6eb524be913898f5" providerId="LiveId" clId="{E7039326-52F2-4C17-82F9-14CED7EEAEB2}" dt="2018-09-08T09:25:51.804" v="231"/>
+          <ac:picMkLst>
+            <pc:docMk/>
+            <pc:sldMk cId="2547119592" sldId="263"/>
+            <ac:picMk id="46" creationId="{700C173E-851F-4E47-A29E-65A0CD1B4219}"/>
+          </ac:picMkLst>
+        </pc:picChg>
+        <pc:picChg chg="add mod">
+          <ac:chgData name="Khaled Hikmat" userId="6eb524be913898f5" providerId="LiveId" clId="{E7039326-52F2-4C17-82F9-14CED7EEAEB2}" dt="2018-09-08T09:57:53.145" v="643" actId="1035"/>
+          <ac:picMkLst>
+            <pc:docMk/>
+            <pc:sldMk cId="2547119592" sldId="263"/>
+            <ac:picMk id="53" creationId="{8C11FCC8-6CFA-418C-AA7A-D26C6A825CB4}"/>
+          </ac:picMkLst>
+        </pc:picChg>
+        <pc:picChg chg="add mod">
+          <ac:chgData name="Khaled Hikmat" userId="6eb524be913898f5" providerId="LiveId" clId="{E7039326-52F2-4C17-82F9-14CED7EEAEB2}" dt="2018-09-08T09:52:18.634" v="562" actId="1076"/>
+          <ac:picMkLst>
+            <pc:docMk/>
+            <pc:sldMk cId="2547119592" sldId="263"/>
+            <ac:picMk id="54" creationId="{C2AD3AF0-5FA7-41C2-AE01-8F06448D3D06}"/>
+          </ac:picMkLst>
+        </pc:picChg>
+        <pc:picChg chg="add mod">
+          <ac:chgData name="Khaled Hikmat" userId="6eb524be913898f5" providerId="LiveId" clId="{E7039326-52F2-4C17-82F9-14CED7EEAEB2}" dt="2018-09-08T09:52:55.287" v="571" actId="1076"/>
+          <ac:picMkLst>
+            <pc:docMk/>
+            <pc:sldMk cId="2547119592" sldId="263"/>
+            <ac:picMk id="56" creationId="{6B37633B-0E03-4DB3-9623-66CA481947E1}"/>
+          </ac:picMkLst>
+        </pc:picChg>
+        <pc:picChg chg="add mod">
+          <ac:chgData name="Khaled Hikmat" userId="6eb524be913898f5" providerId="LiveId" clId="{E7039326-52F2-4C17-82F9-14CED7EEAEB2}" dt="2018-09-08T09:53:01.079" v="572" actId="1076"/>
+          <ac:picMkLst>
+            <pc:docMk/>
+            <pc:sldMk cId="2547119592" sldId="263"/>
+            <ac:picMk id="58" creationId="{69407B88-7814-416D-BE52-E0508D79533E}"/>
+          </ac:picMkLst>
+        </pc:picChg>
+        <pc:picChg chg="add del mod">
+          <ac:chgData name="Khaled Hikmat" userId="6eb524be913898f5" providerId="LiveId" clId="{E7039326-52F2-4C17-82F9-14CED7EEAEB2}" dt="2018-09-08T09:51:42.918" v="556" actId="478"/>
+          <ac:picMkLst>
+            <pc:docMk/>
+            <pc:sldMk cId="2547119592" sldId="263"/>
+            <ac:picMk id="59" creationId="{5BA6E02D-DCFA-4A4C-8094-C8B9C03F4CCE}"/>
+          </ac:picMkLst>
+        </pc:picChg>
+        <pc:picChg chg="add del mod">
+          <ac:chgData name="Khaled Hikmat" userId="6eb524be913898f5" providerId="LiveId" clId="{E7039326-52F2-4C17-82F9-14CED7EEAEB2}" dt="2018-09-08T09:51:42.918" v="556" actId="478"/>
+          <ac:picMkLst>
+            <pc:docMk/>
+            <pc:sldMk cId="2547119592" sldId="263"/>
+            <ac:picMk id="60" creationId="{20CF6F7F-1CFA-4A67-A5A4-5E5B8A3C31B9}"/>
+          </ac:picMkLst>
+        </pc:picChg>
+        <pc:picChg chg="add mod">
+          <ac:chgData name="Khaled Hikmat" userId="6eb524be913898f5" providerId="LiveId" clId="{E7039326-52F2-4C17-82F9-14CED7EEAEB2}" dt="2018-09-08T09:53:01.079" v="572" actId="1076"/>
+          <ac:picMkLst>
+            <pc:docMk/>
+            <pc:sldMk cId="2547119592" sldId="263"/>
+            <ac:picMk id="61" creationId="{A54215CF-824E-4A0B-9FD1-C80E2AF84641}"/>
+          </ac:picMkLst>
+        </pc:picChg>
+        <pc:picChg chg="add del mod">
+          <ac:chgData name="Khaled Hikmat" userId="6eb524be913898f5" providerId="LiveId" clId="{E7039326-52F2-4C17-82F9-14CED7EEAEB2}" dt="2018-09-08T09:52:30.140" v="565" actId="478"/>
+          <ac:picMkLst>
+            <pc:docMk/>
+            <pc:sldMk cId="2547119592" sldId="263"/>
+            <ac:picMk id="63" creationId="{D20BFC6B-882E-48B4-BF31-563E7103E776}"/>
+          </ac:picMkLst>
+        </pc:picChg>
+        <pc:picChg chg="add del mod">
+          <ac:chgData name="Khaled Hikmat" userId="6eb524be913898f5" providerId="LiveId" clId="{E7039326-52F2-4C17-82F9-14CED7EEAEB2}" dt="2018-09-08T09:52:30.140" v="565" actId="478"/>
+          <ac:picMkLst>
+            <pc:docMk/>
+            <pc:sldMk cId="2547119592" sldId="263"/>
+            <ac:picMk id="64" creationId="{7AE87A63-4D56-4B4B-8420-EA171F1CE82A}"/>
+          </ac:picMkLst>
+        </pc:picChg>
+        <pc:picChg chg="add del mod">
+          <ac:chgData name="Khaled Hikmat" userId="6eb524be913898f5" providerId="LiveId" clId="{E7039326-52F2-4C17-82F9-14CED7EEAEB2}" dt="2018-09-08T09:52:30.140" v="565" actId="478"/>
+          <ac:picMkLst>
+            <pc:docMk/>
+            <pc:sldMk cId="2547119592" sldId="263"/>
+            <ac:picMk id="65" creationId="{AABA5944-5E4E-45D0-B896-988EFF5E1DDC}"/>
+          </ac:picMkLst>
+        </pc:picChg>
+        <pc:picChg chg="add mod">
+          <ac:chgData name="Khaled Hikmat" userId="6eb524be913898f5" providerId="LiveId" clId="{E7039326-52F2-4C17-82F9-14CED7EEAEB2}" dt="2018-09-08T11:18:14.304" v="721" actId="1036"/>
+          <ac:picMkLst>
+            <pc:docMk/>
+            <pc:sldMk cId="2547119592" sldId="263"/>
+            <ac:picMk id="66" creationId="{B2F31721-DD80-4EF6-9A0E-0A7A07427837}"/>
+          </ac:picMkLst>
+        </pc:picChg>
+        <pc:picChg chg="add del mod">
+          <ac:chgData name="Khaled Hikmat" userId="6eb524be913898f5" providerId="LiveId" clId="{E7039326-52F2-4C17-82F9-14CED7EEAEB2}" dt="2018-09-08T11:28:40.201" v="726" actId="478"/>
+          <ac:picMkLst>
+            <pc:docMk/>
+            <pc:sldMk cId="2547119592" sldId="263"/>
+            <ac:picMk id="67" creationId="{8B5BBD9B-4480-4BA4-9BC9-16B7B5604A3B}"/>
+          </ac:picMkLst>
+        </pc:picChg>
+        <pc:picChg chg="add mod">
+          <ac:chgData name="Khaled Hikmat" userId="6eb524be913898f5" providerId="LiveId" clId="{E7039326-52F2-4C17-82F9-14CED7EEAEB2}" dt="2018-09-08T09:53:28.453" v="575" actId="554"/>
+          <ac:picMkLst>
+            <pc:docMk/>
+            <pc:sldMk cId="2547119592" sldId="263"/>
+            <ac:picMk id="68" creationId="{3D0554FC-7CE2-47A5-821F-8688C8D16216}"/>
+          </ac:picMkLst>
+        </pc:picChg>
+        <pc:picChg chg="add mod">
+          <ac:chgData name="Khaled Hikmat" userId="6eb524be913898f5" providerId="LiveId" clId="{E7039326-52F2-4C17-82F9-14CED7EEAEB2}" dt="2018-09-08T09:53:28.453" v="575" actId="554"/>
+          <ac:picMkLst>
+            <pc:docMk/>
+            <pc:sldMk cId="2547119592" sldId="263"/>
+            <ac:picMk id="69" creationId="{54BCABE1-2478-46E7-A73E-553F0358E05B}"/>
+          </ac:picMkLst>
+        </pc:picChg>
+        <pc:picChg chg="add mod">
+          <ac:chgData name="Khaled Hikmat" userId="6eb524be913898f5" providerId="LiveId" clId="{E7039326-52F2-4C17-82F9-14CED7EEAEB2}" dt="2018-09-08T09:53:28.453" v="575" actId="554"/>
+          <ac:picMkLst>
+            <pc:docMk/>
+            <pc:sldMk cId="2547119592" sldId="263"/>
+            <ac:picMk id="70" creationId="{765A52F5-B5FB-43A2-9A50-6ED95DEEEAA4}"/>
+          </ac:picMkLst>
+        </pc:picChg>
+        <pc:picChg chg="add mod">
+          <ac:chgData name="Khaled Hikmat" userId="6eb524be913898f5" providerId="LiveId" clId="{E7039326-52F2-4C17-82F9-14CED7EEAEB2}" dt="2018-09-08T11:28:59.422" v="731" actId="1076"/>
+          <ac:picMkLst>
+            <pc:docMk/>
+            <pc:sldMk cId="2547119592" sldId="263"/>
+            <ac:picMk id="105" creationId="{BB323913-39C7-43E9-9C87-6734966E4B1B}"/>
+          </ac:picMkLst>
+        </pc:picChg>
+        <pc:cxnChg chg="add mod">
+          <ac:chgData name="Khaled Hikmat" userId="6eb524be913898f5" providerId="LiveId" clId="{E7039326-52F2-4C17-82F9-14CED7EEAEB2}" dt="2018-09-08T11:17:13.902" v="700" actId="1035"/>
+          <ac:cxnSpMkLst>
+            <pc:docMk/>
+            <pc:sldMk cId="2547119592" sldId="263"/>
+            <ac:cxnSpMk id="76" creationId="{56E9ACCB-C193-4D2F-B9C2-9BB0E5641813}"/>
+          </ac:cxnSpMkLst>
+        </pc:cxnChg>
+        <pc:cxnChg chg="add mod">
+          <ac:chgData name="Khaled Hikmat" userId="6eb524be913898f5" providerId="LiveId" clId="{E7039326-52F2-4C17-82F9-14CED7EEAEB2}" dt="2018-09-08T11:17:13.902" v="700" actId="1035"/>
+          <ac:cxnSpMkLst>
+            <pc:docMk/>
+            <pc:sldMk cId="2547119592" sldId="263"/>
+            <ac:cxnSpMk id="78" creationId="{DDA8FAA7-F927-463F-B544-388F299AB8C3}"/>
+          </ac:cxnSpMkLst>
+        </pc:cxnChg>
+        <pc:cxnChg chg="add mod">
+          <ac:chgData name="Khaled Hikmat" userId="6eb524be913898f5" providerId="LiveId" clId="{E7039326-52F2-4C17-82F9-14CED7EEAEB2}" dt="2018-09-08T11:17:13.902" v="700" actId="1035"/>
+          <ac:cxnSpMkLst>
+            <pc:docMk/>
+            <pc:sldMk cId="2547119592" sldId="263"/>
+            <ac:cxnSpMk id="80" creationId="{AC117495-1F2C-42D8-A2B3-0C9D37386E9C}"/>
+          </ac:cxnSpMkLst>
+        </pc:cxnChg>
+        <pc:cxnChg chg="add mod">
+          <ac:chgData name="Khaled Hikmat" userId="6eb524be913898f5" providerId="LiveId" clId="{E7039326-52F2-4C17-82F9-14CED7EEAEB2}" dt="2018-09-08T11:17:50.402" v="703" actId="1035"/>
+          <ac:cxnSpMkLst>
+            <pc:docMk/>
+            <pc:sldMk cId="2547119592" sldId="263"/>
+            <ac:cxnSpMk id="82" creationId="{25E4BDA7-2A18-4370-A84D-B8AC52AC27C0}"/>
+          </ac:cxnSpMkLst>
+        </pc:cxnChg>
+        <pc:cxnChg chg="add mod">
+          <ac:chgData name="Khaled Hikmat" userId="6eb524be913898f5" providerId="LiveId" clId="{E7039326-52F2-4C17-82F9-14CED7EEAEB2}" dt="2018-09-08T11:17:39.817" v="702" actId="14100"/>
+          <ac:cxnSpMkLst>
+            <pc:docMk/>
+            <pc:sldMk cId="2547119592" sldId="263"/>
+            <ac:cxnSpMk id="84" creationId="{D08DEA6B-1E70-49B4-8F2F-A2E1499A6816}"/>
+          </ac:cxnSpMkLst>
+        </pc:cxnChg>
+        <pc:cxnChg chg="add del mod">
+          <ac:chgData name="Khaled Hikmat" userId="6eb524be913898f5" providerId="LiveId" clId="{E7039326-52F2-4C17-82F9-14CED7EEAEB2}" dt="2018-09-08T10:05:18.169" v="650" actId="478"/>
+          <ac:cxnSpMkLst>
+            <pc:docMk/>
+            <pc:sldMk cId="2547119592" sldId="263"/>
+            <ac:cxnSpMk id="89" creationId="{DE850722-3676-4C29-9FA0-86696AB4DA37}"/>
+          </ac:cxnSpMkLst>
+        </pc:cxnChg>
+        <pc:cxnChg chg="add mod">
+          <ac:chgData name="Khaled Hikmat" userId="6eb524be913898f5" providerId="LiveId" clId="{E7039326-52F2-4C17-82F9-14CED7EEAEB2}" dt="2018-09-08T10:08:33.062" v="681" actId="692"/>
+          <ac:cxnSpMkLst>
+            <pc:docMk/>
+            <pc:sldMk cId="2547119592" sldId="263"/>
+            <ac:cxnSpMk id="93" creationId="{B6243A1C-E4B7-458C-BD1C-4163F2FCD06D}"/>
+          </ac:cxnSpMkLst>
+        </pc:cxnChg>
+        <pc:cxnChg chg="add mod">
+          <ac:chgData name="Khaled Hikmat" userId="6eb524be913898f5" providerId="LiveId" clId="{E7039326-52F2-4C17-82F9-14CED7EEAEB2}" dt="2018-09-08T10:08:33.062" v="681" actId="692"/>
+          <ac:cxnSpMkLst>
+            <pc:docMk/>
+            <pc:sldMk cId="2547119592" sldId="263"/>
+            <ac:cxnSpMk id="95" creationId="{BCFD0A14-E684-443D-896C-40870C040C2E}"/>
+          </ac:cxnSpMkLst>
+        </pc:cxnChg>
+        <pc:cxnChg chg="add del mod">
+          <ac:chgData name="Khaled Hikmat" userId="6eb524be913898f5" providerId="LiveId" clId="{E7039326-52F2-4C17-82F9-14CED7EEAEB2}" dt="2018-09-08T10:06:33.388" v="674" actId="478"/>
+          <ac:cxnSpMkLst>
+            <pc:docMk/>
+            <pc:sldMk cId="2547119592" sldId="263"/>
+            <ac:cxnSpMk id="97" creationId="{04F3BD69-8A71-4793-B40D-2BEAD06C30F6}"/>
+          </ac:cxnSpMkLst>
+        </pc:cxnChg>
+        <pc:cxnChg chg="add mod">
+          <ac:chgData name="Khaled Hikmat" userId="6eb524be913898f5" providerId="LiveId" clId="{E7039326-52F2-4C17-82F9-14CED7EEAEB2}" dt="2018-09-08T10:08:33.062" v="681" actId="692"/>
+          <ac:cxnSpMkLst>
+            <pc:docMk/>
+            <pc:sldMk cId="2547119592" sldId="263"/>
+            <ac:cxnSpMk id="99" creationId="{8DD53BB6-1770-4E26-8F06-7BDDAD724BAB}"/>
+          </ac:cxnSpMkLst>
+        </pc:cxnChg>
+        <pc:cxnChg chg="add mod">
+          <ac:chgData name="Khaled Hikmat" userId="6eb524be913898f5" providerId="LiveId" clId="{E7039326-52F2-4C17-82F9-14CED7EEAEB2}" dt="2018-09-08T10:08:33.062" v="681" actId="692"/>
+          <ac:cxnSpMkLst>
+            <pc:docMk/>
+            <pc:sldMk cId="2547119592" sldId="263"/>
+            <ac:cxnSpMk id="101" creationId="{06833FC5-3C7B-4EBB-8FC0-6EA91C7CBA98}"/>
+          </ac:cxnSpMkLst>
+        </pc:cxnChg>
+      </pc:sldChg>
+    </pc:docChg>
+  </pc:docChgLst>
+</pc:chgInfo>
+</file>
+
 <file path=ppt/slideLayouts/slideLayout1.xml><?xml version="1.0" encoding="utf-8"?>
 <p:sldLayout xmlns:a="http://schemas.openxmlformats.org/drawingml/2006/main" xmlns:r="http://schemas.openxmlformats.org/officeDocument/2006/relationships" xmlns:p="http://schemas.openxmlformats.org/presentationml/2006/main" type="title" preserve="1">
   <p:cSld name="Title Slide">
@@ -265,7 +927,7 @@
           <a:p>
             <a:fld id="{D14DBF75-245C-4196-B4F6-04D583222AB4}" type="datetimeFigureOut">
               <a:rPr lang="en-US" smtClean="0"/>
-              <a:t>8/27/2018</a:t>
+              <a:t>9/8/2018</a:t>
             </a:fld>
             <a:endParaRPr lang="en-US"/>
           </a:p>
@@ -463,7 +1125,7 @@
           <a:p>
             <a:fld id="{D14DBF75-245C-4196-B4F6-04D583222AB4}" type="datetimeFigureOut">
               <a:rPr lang="en-US" smtClean="0"/>
-              <a:t>8/27/2018</a:t>
+              <a:t>9/8/2018</a:t>
             </a:fld>
             <a:endParaRPr lang="en-US"/>
           </a:p>
@@ -671,7 +1333,7 @@
           <a:p>
             <a:fld id="{D14DBF75-245C-4196-B4F6-04D583222AB4}" type="datetimeFigureOut">
               <a:rPr lang="en-US" smtClean="0"/>
-              <a:t>8/27/2018</a:t>
+              <a:t>9/8/2018</a:t>
             </a:fld>
             <a:endParaRPr lang="en-US"/>
           </a:p>
@@ -869,7 +1531,7 @@
           <a:p>
             <a:fld id="{D14DBF75-245C-4196-B4F6-04D583222AB4}" type="datetimeFigureOut">
               <a:rPr lang="en-US" smtClean="0"/>
-              <a:t>8/27/2018</a:t>
+              <a:t>9/8/2018</a:t>
             </a:fld>
             <a:endParaRPr lang="en-US"/>
           </a:p>
@@ -1144,7 +1806,7 @@
           <a:p>
             <a:fld id="{D14DBF75-245C-4196-B4F6-04D583222AB4}" type="datetimeFigureOut">
               <a:rPr lang="en-US" smtClean="0"/>
-              <a:t>8/27/2018</a:t>
+              <a:t>9/8/2018</a:t>
             </a:fld>
             <a:endParaRPr lang="en-US"/>
           </a:p>
@@ -1409,7 +2071,7 @@
           <a:p>
             <a:fld id="{D14DBF75-245C-4196-B4F6-04D583222AB4}" type="datetimeFigureOut">
               <a:rPr lang="en-US" smtClean="0"/>
-              <a:t>8/27/2018</a:t>
+              <a:t>9/8/2018</a:t>
             </a:fld>
             <a:endParaRPr lang="en-US"/>
           </a:p>
@@ -1821,7 +2483,7 @@
           <a:p>
             <a:fld id="{D14DBF75-245C-4196-B4F6-04D583222AB4}" type="datetimeFigureOut">
               <a:rPr lang="en-US" smtClean="0"/>
-              <a:t>8/27/2018</a:t>
+              <a:t>9/8/2018</a:t>
             </a:fld>
             <a:endParaRPr lang="en-US"/>
           </a:p>
@@ -1962,7 +2624,7 @@
           <a:p>
             <a:fld id="{D14DBF75-245C-4196-B4F6-04D583222AB4}" type="datetimeFigureOut">
               <a:rPr lang="en-US" smtClean="0"/>
-              <a:t>8/27/2018</a:t>
+              <a:t>9/8/2018</a:t>
             </a:fld>
             <a:endParaRPr lang="en-US"/>
           </a:p>
@@ -2075,7 +2737,7 @@
           <a:p>
             <a:fld id="{D14DBF75-245C-4196-B4F6-04D583222AB4}" type="datetimeFigureOut">
               <a:rPr lang="en-US" smtClean="0"/>
-              <a:t>8/27/2018</a:t>
+              <a:t>9/8/2018</a:t>
             </a:fld>
             <a:endParaRPr lang="en-US"/>
           </a:p>
@@ -2386,7 +3048,7 @@
           <a:p>
             <a:fld id="{D14DBF75-245C-4196-B4F6-04D583222AB4}" type="datetimeFigureOut">
               <a:rPr lang="en-US" smtClean="0"/>
-              <a:t>8/27/2018</a:t>
+              <a:t>9/8/2018</a:t>
             </a:fld>
             <a:endParaRPr lang="en-US"/>
           </a:p>
@@ -2674,7 +3336,7 @@
           <a:p>
             <a:fld id="{D14DBF75-245C-4196-B4F6-04D583222AB4}" type="datetimeFigureOut">
               <a:rPr lang="en-US" smtClean="0"/>
-              <a:t>8/27/2018</a:t>
+              <a:t>9/8/2018</a:t>
             </a:fld>
             <a:endParaRPr lang="en-US"/>
           </a:p>
@@ -2915,7 +3577,7 @@
           <a:p>
             <a:fld id="{D14DBF75-245C-4196-B4F6-04D583222AB4}" type="datetimeFigureOut">
               <a:rPr lang="en-US" smtClean="0"/>
-              <a:t>8/27/2018</a:t>
+              <a:t>9/8/2018</a:t>
             </a:fld>
             <a:endParaRPr lang="en-US"/>
           </a:p>
@@ -12396,6 +13058,2129 @@
 </p:sld>
 </file>
 
+<file path=ppt/slides/slide8.xml><?xml version="1.0" encoding="utf-8"?>
+<p:sld xmlns:a="http://schemas.openxmlformats.org/drawingml/2006/main" xmlns:r="http://schemas.openxmlformats.org/officeDocument/2006/relationships" xmlns:p="http://schemas.openxmlformats.org/presentationml/2006/main">
+  <p:cSld>
+    <p:spTree>
+      <p:nvGrpSpPr>
+        <p:cNvPr id="1" name=""/>
+        <p:cNvGrpSpPr/>
+        <p:nvPr/>
+      </p:nvGrpSpPr>
+      <p:grpSpPr>
+        <a:xfrm>
+          <a:off x="0" y="0"/>
+          <a:ext cx="0" cy="0"/>
+          <a:chOff x="0" y="0"/>
+          <a:chExt cx="0" cy="0"/>
+        </a:xfrm>
+      </p:grpSpPr>
+      <p:sp>
+        <p:nvSpPr>
+          <p:cNvPr id="57" name="Rectangle 56">
+            <a:extLst>
+              <a:ext uri="{FF2B5EF4-FFF2-40B4-BE49-F238E27FC236}">
+                <a16:creationId xmlns:a16="http://schemas.microsoft.com/office/drawing/2014/main" id="{118814E0-44F0-4428-965F-779C72F728AF}"/>
+              </a:ext>
+            </a:extLst>
+          </p:cNvPr>
+          <p:cNvSpPr/>
+          <p:nvPr/>
+        </p:nvSpPr>
+        <p:spPr>
+          <a:xfrm>
+            <a:off x="7864682" y="4696038"/>
+            <a:ext cx="1961585" cy="2105153"/>
+          </a:xfrm>
+          <a:prstGeom prst="rect">
+            <a:avLst/>
+          </a:prstGeom>
+        </p:spPr>
+        <p:style>
+          <a:lnRef idx="2">
+            <a:schemeClr val="accent2"/>
+          </a:lnRef>
+          <a:fillRef idx="1">
+            <a:schemeClr val="lt1"/>
+          </a:fillRef>
+          <a:effectRef idx="0">
+            <a:schemeClr val="accent2"/>
+          </a:effectRef>
+          <a:fontRef idx="minor">
+            <a:schemeClr val="dk1"/>
+          </a:fontRef>
+        </p:style>
+        <p:txBody>
+          <a:bodyPr rtlCol="0" anchor="ctr"/>
+          <a:lstStyle/>
+          <a:p>
+            <a:pPr algn="ctr"/>
+            <a:endParaRPr lang="en-US"/>
+          </a:p>
+        </p:txBody>
+      </p:sp>
+      <p:sp>
+        <p:nvSpPr>
+          <p:cNvPr id="55" name="Rectangle 54">
+            <a:extLst>
+              <a:ext uri="{FF2B5EF4-FFF2-40B4-BE49-F238E27FC236}">
+                <a16:creationId xmlns:a16="http://schemas.microsoft.com/office/drawing/2014/main" id="{7B13606B-16DA-4E7D-9356-1DB11770EFFC}"/>
+              </a:ext>
+            </a:extLst>
+          </p:cNvPr>
+          <p:cNvSpPr/>
+          <p:nvPr/>
+        </p:nvSpPr>
+        <p:spPr>
+          <a:xfrm>
+            <a:off x="5417756" y="4696038"/>
+            <a:ext cx="1961585" cy="2105153"/>
+          </a:xfrm>
+          <a:prstGeom prst="rect">
+            <a:avLst/>
+          </a:prstGeom>
+        </p:spPr>
+        <p:style>
+          <a:lnRef idx="2">
+            <a:schemeClr val="accent2"/>
+          </a:lnRef>
+          <a:fillRef idx="1">
+            <a:schemeClr val="lt1"/>
+          </a:fillRef>
+          <a:effectRef idx="0">
+            <a:schemeClr val="accent2"/>
+          </a:effectRef>
+          <a:fontRef idx="minor">
+            <a:schemeClr val="dk1"/>
+          </a:fontRef>
+        </p:style>
+        <p:txBody>
+          <a:bodyPr rtlCol="0" anchor="ctr"/>
+          <a:lstStyle/>
+          <a:p>
+            <a:pPr algn="ctr"/>
+            <a:endParaRPr lang="en-US"/>
+          </a:p>
+        </p:txBody>
+      </p:sp>
+      <p:sp>
+        <p:nvSpPr>
+          <p:cNvPr id="2" name="Rectangle 1">
+            <a:extLst>
+              <a:ext uri="{FF2B5EF4-FFF2-40B4-BE49-F238E27FC236}">
+                <a16:creationId xmlns:a16="http://schemas.microsoft.com/office/drawing/2014/main" id="{A4C3FAC5-6374-436A-B019-378AA525E3A0}"/>
+              </a:ext>
+            </a:extLst>
+          </p:cNvPr>
+          <p:cNvSpPr/>
+          <p:nvPr/>
+        </p:nvSpPr>
+        <p:spPr>
+          <a:xfrm>
+            <a:off x="268944" y="1165425"/>
+            <a:ext cx="2702858" cy="954741"/>
+          </a:xfrm>
+          <a:prstGeom prst="rect">
+            <a:avLst/>
+          </a:prstGeom>
+        </p:spPr>
+        <p:style>
+          <a:lnRef idx="2">
+            <a:schemeClr val="accent6"/>
+          </a:lnRef>
+          <a:fillRef idx="1">
+            <a:schemeClr val="lt1"/>
+          </a:fillRef>
+          <a:effectRef idx="0">
+            <a:schemeClr val="accent6"/>
+          </a:effectRef>
+          <a:fontRef idx="minor">
+            <a:schemeClr val="dk1"/>
+          </a:fontRef>
+        </p:style>
+        <p:txBody>
+          <a:bodyPr rtlCol="0" anchor="ctr"/>
+          <a:lstStyle/>
+          <a:p>
+            <a:pPr algn="ctr"/>
+            <a:endParaRPr lang="en-US"/>
+          </a:p>
+        </p:txBody>
+      </p:sp>
+      <p:pic>
+        <p:nvPicPr>
+          <p:cNvPr id="4" name="Picture 3">
+            <a:extLst>
+              <a:ext uri="{FF2B5EF4-FFF2-40B4-BE49-F238E27FC236}">
+                <a16:creationId xmlns:a16="http://schemas.microsoft.com/office/drawing/2014/main" id="{4D9CADDD-610F-4F7B-8BEC-517B1651C5DF}"/>
+              </a:ext>
+            </a:extLst>
+          </p:cNvPr>
+          <p:cNvPicPr>
+            <a:picLocks noChangeAspect="1"/>
+          </p:cNvPicPr>
+          <p:nvPr/>
+        </p:nvPicPr>
+        <p:blipFill>
+          <a:blip r:embed="rId2">
+            <a:extLst>
+              <a:ext uri="{28A0092B-C50C-407E-A947-70E740481C1C}">
+                <a14:useLocalDpi xmlns:a14="http://schemas.microsoft.com/office/drawing/2010/main" val="0"/>
+              </a:ext>
+            </a:extLst>
+          </a:blip>
+          <a:stretch>
+            <a:fillRect/>
+          </a:stretch>
+        </p:blipFill>
+        <p:spPr>
+          <a:xfrm>
+            <a:off x="438153" y="1259561"/>
+            <a:ext cx="879661" cy="742665"/>
+          </a:xfrm>
+          <a:prstGeom prst="rect">
+            <a:avLst/>
+          </a:prstGeom>
+        </p:spPr>
+      </p:pic>
+      <p:pic>
+        <p:nvPicPr>
+          <p:cNvPr id="5" name="Picture 4">
+            <a:extLst>
+              <a:ext uri="{FF2B5EF4-FFF2-40B4-BE49-F238E27FC236}">
+                <a16:creationId xmlns:a16="http://schemas.microsoft.com/office/drawing/2014/main" id="{494D0774-E9A7-472E-9541-8DDFEDC4FF98}"/>
+              </a:ext>
+            </a:extLst>
+          </p:cNvPr>
+          <p:cNvPicPr>
+            <a:picLocks noChangeAspect="1"/>
+          </p:cNvPicPr>
+          <p:nvPr/>
+        </p:nvPicPr>
+        <p:blipFill>
+          <a:blip r:embed="rId3">
+            <a:extLst>
+              <a:ext uri="{28A0092B-C50C-407E-A947-70E740481C1C}">
+                <a14:useLocalDpi xmlns:a14="http://schemas.microsoft.com/office/drawing/2010/main" val="0"/>
+              </a:ext>
+            </a:extLst>
+          </a:blip>
+          <a:stretch>
+            <a:fillRect/>
+          </a:stretch>
+        </p:blipFill>
+        <p:spPr>
+          <a:xfrm>
+            <a:off x="2040918" y="1259561"/>
+            <a:ext cx="679873" cy="679873"/>
+          </a:xfrm>
+          <a:prstGeom prst="rect">
+            <a:avLst/>
+          </a:prstGeom>
+        </p:spPr>
+      </p:pic>
+      <p:sp>
+        <p:nvSpPr>
+          <p:cNvPr id="6" name="Rectangle 5">
+            <a:extLst>
+              <a:ext uri="{FF2B5EF4-FFF2-40B4-BE49-F238E27FC236}">
+                <a16:creationId xmlns:a16="http://schemas.microsoft.com/office/drawing/2014/main" id="{4E946830-3A83-4DEB-B29E-88DA2BE22E7D}"/>
+              </a:ext>
+            </a:extLst>
+          </p:cNvPr>
+          <p:cNvSpPr/>
+          <p:nvPr/>
+        </p:nvSpPr>
+        <p:spPr>
+          <a:xfrm>
+            <a:off x="3437971" y="94134"/>
+            <a:ext cx="4025152" cy="954741"/>
+          </a:xfrm>
+          <a:prstGeom prst="rect">
+            <a:avLst/>
+          </a:prstGeom>
+        </p:spPr>
+        <p:style>
+          <a:lnRef idx="2">
+            <a:schemeClr val="accent6"/>
+          </a:lnRef>
+          <a:fillRef idx="1">
+            <a:schemeClr val="lt1"/>
+          </a:fillRef>
+          <a:effectRef idx="0">
+            <a:schemeClr val="accent6"/>
+          </a:effectRef>
+          <a:fontRef idx="minor">
+            <a:schemeClr val="dk1"/>
+          </a:fontRef>
+        </p:style>
+        <p:txBody>
+          <a:bodyPr rtlCol="0" anchor="ctr"/>
+          <a:lstStyle/>
+          <a:p>
+            <a:pPr algn="ctr"/>
+            <a:endParaRPr lang="en-US"/>
+          </a:p>
+        </p:txBody>
+      </p:sp>
+      <p:pic>
+        <p:nvPicPr>
+          <p:cNvPr id="7" name="Picture 6">
+            <a:extLst>
+              <a:ext uri="{FF2B5EF4-FFF2-40B4-BE49-F238E27FC236}">
+                <a16:creationId xmlns:a16="http://schemas.microsoft.com/office/drawing/2014/main" id="{B9B10F0C-5881-451B-A414-E138E409573F}"/>
+              </a:ext>
+            </a:extLst>
+          </p:cNvPr>
+          <p:cNvPicPr>
+            <a:picLocks noChangeAspect="1"/>
+          </p:cNvPicPr>
+          <p:nvPr/>
+        </p:nvPicPr>
+        <p:blipFill>
+          <a:blip r:embed="rId4">
+            <a:extLst>
+              <a:ext uri="{28A0092B-C50C-407E-A947-70E740481C1C}">
+                <a14:useLocalDpi xmlns:a14="http://schemas.microsoft.com/office/drawing/2010/main" val="0"/>
+              </a:ext>
+            </a:extLst>
+          </a:blip>
+          <a:stretch>
+            <a:fillRect/>
+          </a:stretch>
+        </p:blipFill>
+        <p:spPr>
+          <a:xfrm>
+            <a:off x="3604253" y="181359"/>
+            <a:ext cx="770530" cy="770530"/>
+          </a:xfrm>
+          <a:prstGeom prst="rect">
+            <a:avLst/>
+          </a:prstGeom>
+        </p:spPr>
+      </p:pic>
+      <p:pic>
+        <p:nvPicPr>
+          <p:cNvPr id="8" name="Picture 7">
+            <a:extLst>
+              <a:ext uri="{FF2B5EF4-FFF2-40B4-BE49-F238E27FC236}">
+                <a16:creationId xmlns:a16="http://schemas.microsoft.com/office/drawing/2014/main" id="{BCE7F492-CAA8-47E4-81AC-E456E4256365}"/>
+              </a:ext>
+            </a:extLst>
+          </p:cNvPr>
+          <p:cNvPicPr>
+            <a:picLocks noChangeAspect="1"/>
+          </p:cNvPicPr>
+          <p:nvPr/>
+        </p:nvPicPr>
+        <p:blipFill>
+          <a:blip r:embed="rId5">
+            <a:extLst>
+              <a:ext uri="{28A0092B-C50C-407E-A947-70E740481C1C}">
+                <a14:useLocalDpi xmlns:a14="http://schemas.microsoft.com/office/drawing/2010/main" val="0"/>
+              </a:ext>
+            </a:extLst>
+          </a:blip>
+          <a:stretch>
+            <a:fillRect/>
+          </a:stretch>
+        </p:blipFill>
+        <p:spPr>
+          <a:xfrm>
+            <a:off x="5019203" y="181359"/>
+            <a:ext cx="770531" cy="583357"/>
+          </a:xfrm>
+          <a:prstGeom prst="rect">
+            <a:avLst/>
+          </a:prstGeom>
+        </p:spPr>
+      </p:pic>
+      <p:pic>
+        <p:nvPicPr>
+          <p:cNvPr id="10" name="Picture 9">
+            <a:extLst>
+              <a:ext uri="{FF2B5EF4-FFF2-40B4-BE49-F238E27FC236}">
+                <a16:creationId xmlns:a16="http://schemas.microsoft.com/office/drawing/2014/main" id="{5F6853CF-E321-4AA2-888C-E3E95BB9D98E}"/>
+              </a:ext>
+            </a:extLst>
+          </p:cNvPr>
+          <p:cNvPicPr>
+            <a:picLocks noChangeAspect="1"/>
+          </p:cNvPicPr>
+          <p:nvPr/>
+        </p:nvPicPr>
+        <p:blipFill>
+          <a:blip r:embed="rId6">
+            <a:extLst>
+              <a:ext uri="{28A0092B-C50C-407E-A947-70E740481C1C}">
+                <a14:useLocalDpi xmlns:a14="http://schemas.microsoft.com/office/drawing/2010/main" val="0"/>
+              </a:ext>
+            </a:extLst>
+          </a:blip>
+          <a:stretch>
+            <a:fillRect/>
+          </a:stretch>
+        </p:blipFill>
+        <p:spPr>
+          <a:xfrm>
+            <a:off x="6236283" y="181359"/>
+            <a:ext cx="697187" cy="697187"/>
+          </a:xfrm>
+          <a:prstGeom prst="rect">
+            <a:avLst/>
+          </a:prstGeom>
+        </p:spPr>
+      </p:pic>
+      <p:sp>
+        <p:nvSpPr>
+          <p:cNvPr id="11" name="Rectangle 10">
+            <a:extLst>
+              <a:ext uri="{FF2B5EF4-FFF2-40B4-BE49-F238E27FC236}">
+                <a16:creationId xmlns:a16="http://schemas.microsoft.com/office/drawing/2014/main" id="{E418794F-A7D6-4E60-9C79-68351EA445E9}"/>
+              </a:ext>
+            </a:extLst>
+          </p:cNvPr>
+          <p:cNvSpPr/>
+          <p:nvPr/>
+        </p:nvSpPr>
+        <p:spPr>
+          <a:xfrm>
+            <a:off x="3437971" y="1165430"/>
+            <a:ext cx="4025152" cy="954741"/>
+          </a:xfrm>
+          <a:prstGeom prst="rect">
+            <a:avLst/>
+          </a:prstGeom>
+        </p:spPr>
+        <p:style>
+          <a:lnRef idx="2">
+            <a:schemeClr val="accent6"/>
+          </a:lnRef>
+          <a:fillRef idx="1">
+            <a:schemeClr val="lt1"/>
+          </a:fillRef>
+          <a:effectRef idx="0">
+            <a:schemeClr val="accent6"/>
+          </a:effectRef>
+          <a:fontRef idx="minor">
+            <a:schemeClr val="dk1"/>
+          </a:fontRef>
+        </p:style>
+        <p:txBody>
+          <a:bodyPr rtlCol="0" anchor="ctr"/>
+          <a:lstStyle/>
+          <a:p>
+            <a:pPr algn="ctr"/>
+            <a:endParaRPr lang="en-US"/>
+          </a:p>
+        </p:txBody>
+      </p:sp>
+      <p:pic>
+        <p:nvPicPr>
+          <p:cNvPr id="12" name="Picture 11">
+            <a:extLst>
+              <a:ext uri="{FF2B5EF4-FFF2-40B4-BE49-F238E27FC236}">
+                <a16:creationId xmlns:a16="http://schemas.microsoft.com/office/drawing/2014/main" id="{0B7B7EA5-83D6-4661-AA3E-9EC2B67F123F}"/>
+              </a:ext>
+            </a:extLst>
+          </p:cNvPr>
+          <p:cNvPicPr>
+            <a:picLocks noChangeAspect="1"/>
+          </p:cNvPicPr>
+          <p:nvPr/>
+        </p:nvPicPr>
+        <p:blipFill>
+          <a:blip r:embed="rId4">
+            <a:extLst>
+              <a:ext uri="{28A0092B-C50C-407E-A947-70E740481C1C}">
+                <a14:useLocalDpi xmlns:a14="http://schemas.microsoft.com/office/drawing/2010/main" val="0"/>
+              </a:ext>
+            </a:extLst>
+          </a:blip>
+          <a:stretch>
+            <a:fillRect/>
+          </a:stretch>
+        </p:blipFill>
+        <p:spPr>
+          <a:xfrm>
+            <a:off x="3604253" y="1259561"/>
+            <a:ext cx="770530" cy="770530"/>
+          </a:xfrm>
+          <a:prstGeom prst="rect">
+            <a:avLst/>
+          </a:prstGeom>
+        </p:spPr>
+      </p:pic>
+      <p:pic>
+        <p:nvPicPr>
+          <p:cNvPr id="13" name="Picture 12">
+            <a:extLst>
+              <a:ext uri="{FF2B5EF4-FFF2-40B4-BE49-F238E27FC236}">
+                <a16:creationId xmlns:a16="http://schemas.microsoft.com/office/drawing/2014/main" id="{E6F85EB2-91B5-4137-B2AF-4E73FEA21FCA}"/>
+              </a:ext>
+            </a:extLst>
+          </p:cNvPr>
+          <p:cNvPicPr>
+            <a:picLocks noChangeAspect="1"/>
+          </p:cNvPicPr>
+          <p:nvPr/>
+        </p:nvPicPr>
+        <p:blipFill>
+          <a:blip r:embed="rId5">
+            <a:extLst>
+              <a:ext uri="{28A0092B-C50C-407E-A947-70E740481C1C}">
+                <a14:useLocalDpi xmlns:a14="http://schemas.microsoft.com/office/drawing/2010/main" val="0"/>
+              </a:ext>
+            </a:extLst>
+          </a:blip>
+          <a:stretch>
+            <a:fillRect/>
+          </a:stretch>
+        </p:blipFill>
+        <p:spPr>
+          <a:xfrm>
+            <a:off x="5019203" y="1259561"/>
+            <a:ext cx="770531" cy="583357"/>
+          </a:xfrm>
+          <a:prstGeom prst="rect">
+            <a:avLst/>
+          </a:prstGeom>
+        </p:spPr>
+      </p:pic>
+      <p:pic>
+        <p:nvPicPr>
+          <p:cNvPr id="14" name="Picture 13">
+            <a:extLst>
+              <a:ext uri="{FF2B5EF4-FFF2-40B4-BE49-F238E27FC236}">
+                <a16:creationId xmlns:a16="http://schemas.microsoft.com/office/drawing/2014/main" id="{06D1BABB-3FCD-4B63-9E32-5A522C05D828}"/>
+              </a:ext>
+            </a:extLst>
+          </p:cNvPr>
+          <p:cNvPicPr>
+            <a:picLocks noChangeAspect="1"/>
+          </p:cNvPicPr>
+          <p:nvPr/>
+        </p:nvPicPr>
+        <p:blipFill>
+          <a:blip r:embed="rId6">
+            <a:extLst>
+              <a:ext uri="{28A0092B-C50C-407E-A947-70E740481C1C}">
+                <a14:useLocalDpi xmlns:a14="http://schemas.microsoft.com/office/drawing/2010/main" val="0"/>
+              </a:ext>
+            </a:extLst>
+          </a:blip>
+          <a:stretch>
+            <a:fillRect/>
+          </a:stretch>
+        </p:blipFill>
+        <p:spPr>
+          <a:xfrm>
+            <a:off x="6236283" y="1259561"/>
+            <a:ext cx="697187" cy="697187"/>
+          </a:xfrm>
+          <a:prstGeom prst="rect">
+            <a:avLst/>
+          </a:prstGeom>
+        </p:spPr>
+      </p:pic>
+      <p:sp>
+        <p:nvSpPr>
+          <p:cNvPr id="15" name="Rectangle 14">
+            <a:extLst>
+              <a:ext uri="{FF2B5EF4-FFF2-40B4-BE49-F238E27FC236}">
+                <a16:creationId xmlns:a16="http://schemas.microsoft.com/office/drawing/2014/main" id="{5DC54626-E07B-4327-8D20-77066B8D2106}"/>
+              </a:ext>
+            </a:extLst>
+          </p:cNvPr>
+          <p:cNvSpPr/>
+          <p:nvPr/>
+        </p:nvSpPr>
+        <p:spPr>
+          <a:xfrm>
+            <a:off x="7853674" y="1156185"/>
+            <a:ext cx="4025152" cy="977140"/>
+          </a:xfrm>
+          <a:prstGeom prst="rect">
+            <a:avLst/>
+          </a:prstGeom>
+        </p:spPr>
+        <p:style>
+          <a:lnRef idx="2">
+            <a:schemeClr val="accent6"/>
+          </a:lnRef>
+          <a:fillRef idx="1">
+            <a:schemeClr val="lt1"/>
+          </a:fillRef>
+          <a:effectRef idx="0">
+            <a:schemeClr val="accent6"/>
+          </a:effectRef>
+          <a:fontRef idx="minor">
+            <a:schemeClr val="dk1"/>
+          </a:fontRef>
+        </p:style>
+        <p:txBody>
+          <a:bodyPr rtlCol="0" anchor="ctr"/>
+          <a:lstStyle/>
+          <a:p>
+            <a:pPr algn="ctr"/>
+            <a:endParaRPr lang="en-US"/>
+          </a:p>
+        </p:txBody>
+      </p:sp>
+      <p:pic>
+        <p:nvPicPr>
+          <p:cNvPr id="16" name="Picture 15">
+            <a:extLst>
+              <a:ext uri="{FF2B5EF4-FFF2-40B4-BE49-F238E27FC236}">
+                <a16:creationId xmlns:a16="http://schemas.microsoft.com/office/drawing/2014/main" id="{72E93150-C282-4F44-AB5C-16CDB5B6DF4C}"/>
+              </a:ext>
+            </a:extLst>
+          </p:cNvPr>
+          <p:cNvPicPr>
+            <a:picLocks noChangeAspect="1"/>
+          </p:cNvPicPr>
+          <p:nvPr/>
+        </p:nvPicPr>
+        <p:blipFill>
+          <a:blip r:embed="rId4">
+            <a:extLst>
+              <a:ext uri="{28A0092B-C50C-407E-A947-70E740481C1C}">
+                <a14:useLocalDpi xmlns:a14="http://schemas.microsoft.com/office/drawing/2010/main" val="0"/>
+              </a:ext>
+            </a:extLst>
+          </a:blip>
+          <a:stretch>
+            <a:fillRect/>
+          </a:stretch>
+        </p:blipFill>
+        <p:spPr>
+          <a:xfrm>
+            <a:off x="9119020" y="1235985"/>
+            <a:ext cx="770530" cy="770530"/>
+          </a:xfrm>
+          <a:prstGeom prst="rect">
+            <a:avLst/>
+          </a:prstGeom>
+        </p:spPr>
+      </p:pic>
+      <p:pic>
+        <p:nvPicPr>
+          <p:cNvPr id="18" name="Picture 17">
+            <a:extLst>
+              <a:ext uri="{FF2B5EF4-FFF2-40B4-BE49-F238E27FC236}">
+                <a16:creationId xmlns:a16="http://schemas.microsoft.com/office/drawing/2014/main" id="{EB895E9D-BD00-47FA-85B9-3A8F4089C7E7}"/>
+              </a:ext>
+            </a:extLst>
+          </p:cNvPr>
+          <p:cNvPicPr>
+            <a:picLocks noChangeAspect="1"/>
+          </p:cNvPicPr>
+          <p:nvPr/>
+        </p:nvPicPr>
+        <p:blipFill>
+          <a:blip r:embed="rId6">
+            <a:extLst>
+              <a:ext uri="{28A0092B-C50C-407E-A947-70E740481C1C}">
+                <a14:useLocalDpi xmlns:a14="http://schemas.microsoft.com/office/drawing/2010/main" val="0"/>
+              </a:ext>
+            </a:extLst>
+          </a:blip>
+          <a:stretch>
+            <a:fillRect/>
+          </a:stretch>
+        </p:blipFill>
+        <p:spPr>
+          <a:xfrm>
+            <a:off x="11131597" y="1254798"/>
+            <a:ext cx="697187" cy="697187"/>
+          </a:xfrm>
+          <a:prstGeom prst="rect">
+            <a:avLst/>
+          </a:prstGeom>
+        </p:spPr>
+      </p:pic>
+      <p:pic>
+        <p:nvPicPr>
+          <p:cNvPr id="19" name="Picture 18">
+            <a:extLst>
+              <a:ext uri="{FF2B5EF4-FFF2-40B4-BE49-F238E27FC236}">
+                <a16:creationId xmlns:a16="http://schemas.microsoft.com/office/drawing/2014/main" id="{E27EC875-55FB-49CF-969C-9098EF5F151D}"/>
+              </a:ext>
+            </a:extLst>
+          </p:cNvPr>
+          <p:cNvPicPr>
+            <a:picLocks noChangeAspect="1"/>
+          </p:cNvPicPr>
+          <p:nvPr/>
+        </p:nvPicPr>
+        <p:blipFill>
+          <a:blip r:embed="rId7">
+            <a:extLst>
+              <a:ext uri="{28A0092B-C50C-407E-A947-70E740481C1C}">
+                <a14:useLocalDpi xmlns:a14="http://schemas.microsoft.com/office/drawing/2010/main" val="0"/>
+              </a:ext>
+            </a:extLst>
+          </a:blip>
+          <a:stretch>
+            <a:fillRect/>
+          </a:stretch>
+        </p:blipFill>
+        <p:spPr>
+          <a:xfrm>
+            <a:off x="4915438" y="3379296"/>
+            <a:ext cx="978060" cy="989354"/>
+          </a:xfrm>
+          <a:prstGeom prst="rect">
+            <a:avLst/>
+          </a:prstGeom>
+        </p:spPr>
+      </p:pic>
+      <p:sp>
+        <p:nvSpPr>
+          <p:cNvPr id="22" name="Rectangle 21">
+            <a:extLst>
+              <a:ext uri="{FF2B5EF4-FFF2-40B4-BE49-F238E27FC236}">
+                <a16:creationId xmlns:a16="http://schemas.microsoft.com/office/drawing/2014/main" id="{A8B5718A-2C4D-4AC9-9697-835F284B5CC3}"/>
+              </a:ext>
+            </a:extLst>
+          </p:cNvPr>
+          <p:cNvSpPr/>
+          <p:nvPr/>
+        </p:nvSpPr>
+        <p:spPr>
+          <a:xfrm>
+            <a:off x="3023170" y="4696038"/>
+            <a:ext cx="1961585" cy="2105153"/>
+          </a:xfrm>
+          <a:prstGeom prst="rect">
+            <a:avLst/>
+          </a:prstGeom>
+        </p:spPr>
+        <p:style>
+          <a:lnRef idx="2">
+            <a:schemeClr val="accent2"/>
+          </a:lnRef>
+          <a:fillRef idx="1">
+            <a:schemeClr val="lt1"/>
+          </a:fillRef>
+          <a:effectRef idx="0">
+            <a:schemeClr val="accent2"/>
+          </a:effectRef>
+          <a:fontRef idx="minor">
+            <a:schemeClr val="dk1"/>
+          </a:fontRef>
+        </p:style>
+        <p:txBody>
+          <a:bodyPr rtlCol="0" anchor="ctr"/>
+          <a:lstStyle/>
+          <a:p>
+            <a:pPr algn="ctr"/>
+            <a:endParaRPr lang="en-US"/>
+          </a:p>
+        </p:txBody>
+      </p:sp>
+      <p:pic>
+        <p:nvPicPr>
+          <p:cNvPr id="23" name="Picture 22">
+            <a:extLst>
+              <a:ext uri="{FF2B5EF4-FFF2-40B4-BE49-F238E27FC236}">
+                <a16:creationId xmlns:a16="http://schemas.microsoft.com/office/drawing/2014/main" id="{BCE23D8A-4916-4D3A-9A2B-0263C8889806}"/>
+              </a:ext>
+            </a:extLst>
+          </p:cNvPr>
+          <p:cNvPicPr>
+            <a:picLocks noChangeAspect="1"/>
+          </p:cNvPicPr>
+          <p:nvPr/>
+        </p:nvPicPr>
+        <p:blipFill>
+          <a:blip r:embed="rId4">
+            <a:extLst>
+              <a:ext uri="{28A0092B-C50C-407E-A947-70E740481C1C}">
+                <a14:useLocalDpi xmlns:a14="http://schemas.microsoft.com/office/drawing/2010/main" val="0"/>
+              </a:ext>
+            </a:extLst>
+          </a:blip>
+          <a:stretch>
+            <a:fillRect/>
+          </a:stretch>
+        </p:blipFill>
+        <p:spPr>
+          <a:xfrm>
+            <a:off x="3194607" y="4786626"/>
+            <a:ext cx="682931" cy="682931"/>
+          </a:xfrm>
+          <a:prstGeom prst="rect">
+            <a:avLst/>
+          </a:prstGeom>
+        </p:spPr>
+      </p:pic>
+      <p:pic>
+        <p:nvPicPr>
+          <p:cNvPr id="27" name="Picture 26">
+            <a:extLst>
+              <a:ext uri="{FF2B5EF4-FFF2-40B4-BE49-F238E27FC236}">
+                <a16:creationId xmlns:a16="http://schemas.microsoft.com/office/drawing/2014/main" id="{07890601-3EBB-4033-8800-8F083795EEC1}"/>
+              </a:ext>
+            </a:extLst>
+          </p:cNvPr>
+          <p:cNvPicPr>
+            <a:picLocks noChangeAspect="1"/>
+          </p:cNvPicPr>
+          <p:nvPr/>
+        </p:nvPicPr>
+        <p:blipFill>
+          <a:blip r:embed="rId8">
+            <a:extLst>
+              <a:ext uri="{28A0092B-C50C-407E-A947-70E740481C1C}">
+                <a14:useLocalDpi xmlns:a14="http://schemas.microsoft.com/office/drawing/2010/main" val="0"/>
+              </a:ext>
+            </a:extLst>
+          </a:blip>
+          <a:stretch>
+            <a:fillRect/>
+          </a:stretch>
+        </p:blipFill>
+        <p:spPr>
+          <a:xfrm>
+            <a:off x="8003728" y="1193746"/>
+            <a:ext cx="780290" cy="780290"/>
+          </a:xfrm>
+          <a:prstGeom prst="rect">
+            <a:avLst/>
+          </a:prstGeom>
+        </p:spPr>
+      </p:pic>
+      <p:pic>
+        <p:nvPicPr>
+          <p:cNvPr id="30" name="Picture 29">
+            <a:extLst>
+              <a:ext uri="{FF2B5EF4-FFF2-40B4-BE49-F238E27FC236}">
+                <a16:creationId xmlns:a16="http://schemas.microsoft.com/office/drawing/2014/main" id="{4E663854-43A8-4DC5-B1B6-E3FAC90ECAD9}"/>
+              </a:ext>
+            </a:extLst>
+          </p:cNvPr>
+          <p:cNvPicPr>
+            <a:picLocks noChangeAspect="1"/>
+          </p:cNvPicPr>
+          <p:nvPr/>
+        </p:nvPicPr>
+        <p:blipFill>
+          <a:blip r:embed="rId4">
+            <a:extLst>
+              <a:ext uri="{28A0092B-C50C-407E-A947-70E740481C1C}">
+                <a14:useLocalDpi xmlns:a14="http://schemas.microsoft.com/office/drawing/2010/main" val="0"/>
+              </a:ext>
+            </a:extLst>
+          </a:blip>
+          <a:stretch>
+            <a:fillRect/>
+          </a:stretch>
+        </p:blipFill>
+        <p:spPr>
+          <a:xfrm>
+            <a:off x="5604624" y="4765955"/>
+            <a:ext cx="682931" cy="682931"/>
+          </a:xfrm>
+          <a:prstGeom prst="rect">
+            <a:avLst/>
+          </a:prstGeom>
+        </p:spPr>
+      </p:pic>
+      <p:sp>
+        <p:nvSpPr>
+          <p:cNvPr id="39" name="Rectangle 38">
+            <a:extLst>
+              <a:ext uri="{FF2B5EF4-FFF2-40B4-BE49-F238E27FC236}">
+                <a16:creationId xmlns:a16="http://schemas.microsoft.com/office/drawing/2014/main" id="{79D54F6B-2F00-4957-9C51-A2A039CA55F5}"/>
+              </a:ext>
+            </a:extLst>
+          </p:cNvPr>
+          <p:cNvSpPr/>
+          <p:nvPr/>
+        </p:nvSpPr>
+        <p:spPr>
+          <a:xfrm>
+            <a:off x="3437971" y="2258026"/>
+            <a:ext cx="4025152" cy="954741"/>
+          </a:xfrm>
+          <a:prstGeom prst="rect">
+            <a:avLst/>
+          </a:prstGeom>
+        </p:spPr>
+        <p:style>
+          <a:lnRef idx="2">
+            <a:schemeClr val="accent6"/>
+          </a:lnRef>
+          <a:fillRef idx="1">
+            <a:schemeClr val="lt1"/>
+          </a:fillRef>
+          <a:effectRef idx="0">
+            <a:schemeClr val="accent6"/>
+          </a:effectRef>
+          <a:fontRef idx="minor">
+            <a:schemeClr val="dk1"/>
+          </a:fontRef>
+        </p:style>
+        <p:txBody>
+          <a:bodyPr rtlCol="0" anchor="ctr"/>
+          <a:lstStyle/>
+          <a:p>
+            <a:pPr algn="ctr"/>
+            <a:endParaRPr lang="en-US"/>
+          </a:p>
+        </p:txBody>
+      </p:sp>
+      <p:pic>
+        <p:nvPicPr>
+          <p:cNvPr id="40" name="Picture 39">
+            <a:extLst>
+              <a:ext uri="{FF2B5EF4-FFF2-40B4-BE49-F238E27FC236}">
+                <a16:creationId xmlns:a16="http://schemas.microsoft.com/office/drawing/2014/main" id="{1FD04BA0-4642-4B93-AA93-913D8E3B1239}"/>
+              </a:ext>
+            </a:extLst>
+          </p:cNvPr>
+          <p:cNvPicPr>
+            <a:picLocks noChangeAspect="1"/>
+          </p:cNvPicPr>
+          <p:nvPr/>
+        </p:nvPicPr>
+        <p:blipFill>
+          <a:blip r:embed="rId4">
+            <a:extLst>
+              <a:ext uri="{28A0092B-C50C-407E-A947-70E740481C1C}">
+                <a14:useLocalDpi xmlns:a14="http://schemas.microsoft.com/office/drawing/2010/main" val="0"/>
+              </a:ext>
+            </a:extLst>
+          </a:blip>
+          <a:stretch>
+            <a:fillRect/>
+          </a:stretch>
+        </p:blipFill>
+        <p:spPr>
+          <a:xfrm>
+            <a:off x="3604253" y="2345251"/>
+            <a:ext cx="770530" cy="770530"/>
+          </a:xfrm>
+          <a:prstGeom prst="rect">
+            <a:avLst/>
+          </a:prstGeom>
+        </p:spPr>
+      </p:pic>
+      <p:pic>
+        <p:nvPicPr>
+          <p:cNvPr id="41" name="Picture 40">
+            <a:extLst>
+              <a:ext uri="{FF2B5EF4-FFF2-40B4-BE49-F238E27FC236}">
+                <a16:creationId xmlns:a16="http://schemas.microsoft.com/office/drawing/2014/main" id="{9E4FC6EA-A10C-48CF-9B11-3B61D3214E0B}"/>
+              </a:ext>
+            </a:extLst>
+          </p:cNvPr>
+          <p:cNvPicPr>
+            <a:picLocks noChangeAspect="1"/>
+          </p:cNvPicPr>
+          <p:nvPr/>
+        </p:nvPicPr>
+        <p:blipFill>
+          <a:blip r:embed="rId5">
+            <a:extLst>
+              <a:ext uri="{28A0092B-C50C-407E-A947-70E740481C1C}">
+                <a14:useLocalDpi xmlns:a14="http://schemas.microsoft.com/office/drawing/2010/main" val="0"/>
+              </a:ext>
+            </a:extLst>
+          </a:blip>
+          <a:stretch>
+            <a:fillRect/>
+          </a:stretch>
+        </p:blipFill>
+        <p:spPr>
+          <a:xfrm>
+            <a:off x="5019203" y="2345251"/>
+            <a:ext cx="770531" cy="583357"/>
+          </a:xfrm>
+          <a:prstGeom prst="rect">
+            <a:avLst/>
+          </a:prstGeom>
+        </p:spPr>
+      </p:pic>
+      <p:pic>
+        <p:nvPicPr>
+          <p:cNvPr id="42" name="Picture 41">
+            <a:extLst>
+              <a:ext uri="{FF2B5EF4-FFF2-40B4-BE49-F238E27FC236}">
+                <a16:creationId xmlns:a16="http://schemas.microsoft.com/office/drawing/2014/main" id="{69AD8C5C-55DB-4260-95C4-9FFF17702F27}"/>
+              </a:ext>
+            </a:extLst>
+          </p:cNvPr>
+          <p:cNvPicPr>
+            <a:picLocks noChangeAspect="1"/>
+          </p:cNvPicPr>
+          <p:nvPr/>
+        </p:nvPicPr>
+        <p:blipFill>
+          <a:blip r:embed="rId6">
+            <a:extLst>
+              <a:ext uri="{28A0092B-C50C-407E-A947-70E740481C1C}">
+                <a14:useLocalDpi xmlns:a14="http://schemas.microsoft.com/office/drawing/2010/main" val="0"/>
+              </a:ext>
+            </a:extLst>
+          </a:blip>
+          <a:stretch>
+            <a:fillRect/>
+          </a:stretch>
+        </p:blipFill>
+        <p:spPr>
+          <a:xfrm>
+            <a:off x="6236283" y="2345251"/>
+            <a:ext cx="697187" cy="697187"/>
+          </a:xfrm>
+          <a:prstGeom prst="rect">
+            <a:avLst/>
+          </a:prstGeom>
+        </p:spPr>
+      </p:pic>
+      <p:sp>
+        <p:nvSpPr>
+          <p:cNvPr id="47" name="TextBox 46">
+            <a:extLst>
+              <a:ext uri="{FF2B5EF4-FFF2-40B4-BE49-F238E27FC236}">
+                <a16:creationId xmlns:a16="http://schemas.microsoft.com/office/drawing/2014/main" id="{654B87CC-0DB4-474F-B488-55D92BE2D483}"/>
+              </a:ext>
+            </a:extLst>
+          </p:cNvPr>
+          <p:cNvSpPr txBox="1"/>
+          <p:nvPr/>
+        </p:nvSpPr>
+        <p:spPr>
+          <a:xfrm>
+            <a:off x="3375210" y="838037"/>
+            <a:ext cx="1869733" cy="276999"/>
+          </a:xfrm>
+          <a:prstGeom prst="rect">
+            <a:avLst/>
+          </a:prstGeom>
+          <a:noFill/>
+        </p:spPr>
+        <p:txBody>
+          <a:bodyPr wrap="square" rtlCol="0">
+            <a:spAutoFit/>
+          </a:bodyPr>
+          <a:lstStyle/>
+          <a:p>
+            <a:r>
+              <a:rPr lang="en-US" sz="1200" b="1" dirty="0">
+                <a:solidFill>
+                  <a:schemeClr val="accent6"/>
+                </a:solidFill>
+                <a:latin typeface="Segoe UI Light" panose="020B0502040204020203" pitchFamily="34" charset="0"/>
+                <a:cs typeface="Segoe UI Light" panose="020B0502040204020203" pitchFamily="34" charset="0"/>
+              </a:rPr>
+              <a:t>Drivers API Microservice</a:t>
+            </a:r>
+          </a:p>
+        </p:txBody>
+      </p:sp>
+      <p:sp>
+        <p:nvSpPr>
+          <p:cNvPr id="49" name="TextBox 48">
+            <a:extLst>
+              <a:ext uri="{FF2B5EF4-FFF2-40B4-BE49-F238E27FC236}">
+                <a16:creationId xmlns:a16="http://schemas.microsoft.com/office/drawing/2014/main" id="{C769A4FF-3FB7-4160-BC4C-03A88D991591}"/>
+              </a:ext>
+            </a:extLst>
+          </p:cNvPr>
+          <p:cNvSpPr txBox="1"/>
+          <p:nvPr/>
+        </p:nvSpPr>
+        <p:spPr>
+          <a:xfrm>
+            <a:off x="3377581" y="1900671"/>
+            <a:ext cx="2288110" cy="276999"/>
+          </a:xfrm>
+          <a:prstGeom prst="rect">
+            <a:avLst/>
+          </a:prstGeom>
+          <a:noFill/>
+        </p:spPr>
+        <p:txBody>
+          <a:bodyPr wrap="square" rtlCol="0">
+            <a:spAutoFit/>
+          </a:bodyPr>
+          <a:lstStyle/>
+          <a:p>
+            <a:r>
+              <a:rPr lang="en-US" sz="1200" b="1" dirty="0">
+                <a:solidFill>
+                  <a:schemeClr val="accent6"/>
+                </a:solidFill>
+                <a:latin typeface="Segoe UI Light" panose="020B0502040204020203" pitchFamily="34" charset="0"/>
+                <a:cs typeface="Segoe UI Light" panose="020B0502040204020203" pitchFamily="34" charset="0"/>
+              </a:rPr>
+              <a:t>Trips API Microservice</a:t>
+            </a:r>
+          </a:p>
+        </p:txBody>
+      </p:sp>
+      <p:sp>
+        <p:nvSpPr>
+          <p:cNvPr id="50" name="TextBox 49">
+            <a:extLst>
+              <a:ext uri="{FF2B5EF4-FFF2-40B4-BE49-F238E27FC236}">
+                <a16:creationId xmlns:a16="http://schemas.microsoft.com/office/drawing/2014/main" id="{02CC22E0-26E2-4377-8C2D-36B359CC48F8}"/>
+              </a:ext>
+            </a:extLst>
+          </p:cNvPr>
+          <p:cNvSpPr txBox="1"/>
+          <p:nvPr/>
+        </p:nvSpPr>
+        <p:spPr>
+          <a:xfrm>
+            <a:off x="3418520" y="2968992"/>
+            <a:ext cx="2288110" cy="276999"/>
+          </a:xfrm>
+          <a:prstGeom prst="rect">
+            <a:avLst/>
+          </a:prstGeom>
+          <a:noFill/>
+        </p:spPr>
+        <p:txBody>
+          <a:bodyPr wrap="square" rtlCol="0">
+            <a:spAutoFit/>
+          </a:bodyPr>
+          <a:lstStyle/>
+          <a:p>
+            <a:r>
+              <a:rPr lang="en-US" sz="1200" b="1" dirty="0">
+                <a:solidFill>
+                  <a:schemeClr val="accent6"/>
+                </a:solidFill>
+                <a:latin typeface="Segoe UI Light" panose="020B0502040204020203" pitchFamily="34" charset="0"/>
+                <a:cs typeface="Segoe UI Light" panose="020B0502040204020203" pitchFamily="34" charset="0"/>
+              </a:rPr>
+              <a:t>Passengers API Microservice</a:t>
+            </a:r>
+          </a:p>
+        </p:txBody>
+      </p:sp>
+      <p:sp>
+        <p:nvSpPr>
+          <p:cNvPr id="51" name="TextBox 50">
+            <a:extLst>
+              <a:ext uri="{FF2B5EF4-FFF2-40B4-BE49-F238E27FC236}">
+                <a16:creationId xmlns:a16="http://schemas.microsoft.com/office/drawing/2014/main" id="{9CD94937-464E-4804-9887-6FD9C8567A39}"/>
+              </a:ext>
+            </a:extLst>
+          </p:cNvPr>
+          <p:cNvSpPr txBox="1"/>
+          <p:nvPr/>
+        </p:nvSpPr>
+        <p:spPr>
+          <a:xfrm>
+            <a:off x="7802310" y="1909353"/>
+            <a:ext cx="2288110" cy="276999"/>
+          </a:xfrm>
+          <a:prstGeom prst="rect">
+            <a:avLst/>
+          </a:prstGeom>
+          <a:noFill/>
+        </p:spPr>
+        <p:txBody>
+          <a:bodyPr wrap="square" rtlCol="0">
+            <a:spAutoFit/>
+          </a:bodyPr>
+          <a:lstStyle/>
+          <a:p>
+            <a:r>
+              <a:rPr lang="en-US" sz="1200" b="1" dirty="0">
+                <a:solidFill>
+                  <a:schemeClr val="accent6"/>
+                </a:solidFill>
+                <a:latin typeface="Segoe UI Light" panose="020B0502040204020203" pitchFamily="34" charset="0"/>
+                <a:cs typeface="Segoe UI Light" panose="020B0502040204020203" pitchFamily="34" charset="0"/>
+              </a:rPr>
+              <a:t>Orchestrators Microservice</a:t>
+            </a:r>
+          </a:p>
+        </p:txBody>
+      </p:sp>
+      <p:pic>
+        <p:nvPicPr>
+          <p:cNvPr id="53" name="Picture 52">
+            <a:extLst>
+              <a:ext uri="{FF2B5EF4-FFF2-40B4-BE49-F238E27FC236}">
+                <a16:creationId xmlns:a16="http://schemas.microsoft.com/office/drawing/2014/main" id="{8C11FCC8-6CFA-418C-AA7A-D26C6A825CB4}"/>
+              </a:ext>
+            </a:extLst>
+          </p:cNvPr>
+          <p:cNvPicPr>
+            <a:picLocks noChangeAspect="1"/>
+          </p:cNvPicPr>
+          <p:nvPr/>
+        </p:nvPicPr>
+        <p:blipFill>
+          <a:blip r:embed="rId9">
+            <a:extLst>
+              <a:ext uri="{28A0092B-C50C-407E-A947-70E740481C1C}">
+                <a14:useLocalDpi xmlns:a14="http://schemas.microsoft.com/office/drawing/2010/main" val="0"/>
+              </a:ext>
+            </a:extLst>
+          </a:blip>
+          <a:stretch>
+            <a:fillRect/>
+          </a:stretch>
+        </p:blipFill>
+        <p:spPr>
+          <a:xfrm>
+            <a:off x="10108778" y="1235985"/>
+            <a:ext cx="780290" cy="780290"/>
+          </a:xfrm>
+          <a:prstGeom prst="rect">
+            <a:avLst/>
+          </a:prstGeom>
+        </p:spPr>
+      </p:pic>
+      <p:pic>
+        <p:nvPicPr>
+          <p:cNvPr id="54" name="Picture 53">
+            <a:extLst>
+              <a:ext uri="{FF2B5EF4-FFF2-40B4-BE49-F238E27FC236}">
+                <a16:creationId xmlns:a16="http://schemas.microsoft.com/office/drawing/2014/main" id="{C2AD3AF0-5FA7-41C2-AE01-8F06448D3D06}"/>
+              </a:ext>
+            </a:extLst>
+          </p:cNvPr>
+          <p:cNvPicPr>
+            <a:picLocks noChangeAspect="1"/>
+          </p:cNvPicPr>
+          <p:nvPr/>
+        </p:nvPicPr>
+        <p:blipFill>
+          <a:blip r:embed="rId6">
+            <a:extLst>
+              <a:ext uri="{28A0092B-C50C-407E-A947-70E740481C1C}">
+                <a14:useLocalDpi xmlns:a14="http://schemas.microsoft.com/office/drawing/2010/main" val="0"/>
+              </a:ext>
+            </a:extLst>
+          </a:blip>
+          <a:stretch>
+            <a:fillRect/>
+          </a:stretch>
+        </p:blipFill>
+        <p:spPr>
+          <a:xfrm>
+            <a:off x="4204924" y="4791972"/>
+            <a:ext cx="697187" cy="697187"/>
+          </a:xfrm>
+          <a:prstGeom prst="rect">
+            <a:avLst/>
+          </a:prstGeom>
+        </p:spPr>
+      </p:pic>
+      <p:pic>
+        <p:nvPicPr>
+          <p:cNvPr id="56" name="Picture 55">
+            <a:extLst>
+              <a:ext uri="{FF2B5EF4-FFF2-40B4-BE49-F238E27FC236}">
+                <a16:creationId xmlns:a16="http://schemas.microsoft.com/office/drawing/2014/main" id="{6B37633B-0E03-4DB3-9623-66CA481947E1}"/>
+              </a:ext>
+            </a:extLst>
+          </p:cNvPr>
+          <p:cNvPicPr>
+            <a:picLocks noChangeAspect="1"/>
+          </p:cNvPicPr>
+          <p:nvPr/>
+        </p:nvPicPr>
+        <p:blipFill>
+          <a:blip r:embed="rId6">
+            <a:extLst>
+              <a:ext uri="{28A0092B-C50C-407E-A947-70E740481C1C}">
+                <a14:useLocalDpi xmlns:a14="http://schemas.microsoft.com/office/drawing/2010/main" val="0"/>
+              </a:ext>
+            </a:extLst>
+          </a:blip>
+          <a:stretch>
+            <a:fillRect/>
+          </a:stretch>
+        </p:blipFill>
+        <p:spPr>
+          <a:xfrm>
+            <a:off x="6604152" y="4814190"/>
+            <a:ext cx="697187" cy="697187"/>
+          </a:xfrm>
+          <a:prstGeom prst="rect">
+            <a:avLst/>
+          </a:prstGeom>
+        </p:spPr>
+      </p:pic>
+      <p:pic>
+        <p:nvPicPr>
+          <p:cNvPr id="58" name="Picture 57">
+            <a:extLst>
+              <a:ext uri="{FF2B5EF4-FFF2-40B4-BE49-F238E27FC236}">
+                <a16:creationId xmlns:a16="http://schemas.microsoft.com/office/drawing/2014/main" id="{69407B88-7814-416D-BE52-E0508D79533E}"/>
+              </a:ext>
+            </a:extLst>
+          </p:cNvPr>
+          <p:cNvPicPr>
+            <a:picLocks noChangeAspect="1"/>
+          </p:cNvPicPr>
+          <p:nvPr/>
+        </p:nvPicPr>
+        <p:blipFill>
+          <a:blip r:embed="rId4">
+            <a:extLst>
+              <a:ext uri="{28A0092B-C50C-407E-A947-70E740481C1C}">
+                <a14:useLocalDpi xmlns:a14="http://schemas.microsoft.com/office/drawing/2010/main" val="0"/>
+              </a:ext>
+            </a:extLst>
+          </a:blip>
+          <a:stretch>
+            <a:fillRect/>
+          </a:stretch>
+        </p:blipFill>
+        <p:spPr>
+          <a:xfrm>
+            <a:off x="8051550" y="4768975"/>
+            <a:ext cx="682931" cy="682931"/>
+          </a:xfrm>
+          <a:prstGeom prst="rect">
+            <a:avLst/>
+          </a:prstGeom>
+        </p:spPr>
+      </p:pic>
+      <p:pic>
+        <p:nvPicPr>
+          <p:cNvPr id="61" name="Picture 60">
+            <a:extLst>
+              <a:ext uri="{FF2B5EF4-FFF2-40B4-BE49-F238E27FC236}">
+                <a16:creationId xmlns:a16="http://schemas.microsoft.com/office/drawing/2014/main" id="{A54215CF-824E-4A0B-9FD1-C80E2AF84641}"/>
+              </a:ext>
+            </a:extLst>
+          </p:cNvPr>
+          <p:cNvPicPr>
+            <a:picLocks noChangeAspect="1"/>
+          </p:cNvPicPr>
+          <p:nvPr/>
+        </p:nvPicPr>
+        <p:blipFill>
+          <a:blip r:embed="rId6">
+            <a:extLst>
+              <a:ext uri="{28A0092B-C50C-407E-A947-70E740481C1C}">
+                <a14:useLocalDpi xmlns:a14="http://schemas.microsoft.com/office/drawing/2010/main" val="0"/>
+              </a:ext>
+            </a:extLst>
+          </a:blip>
+          <a:stretch>
+            <a:fillRect/>
+          </a:stretch>
+        </p:blipFill>
+        <p:spPr>
+          <a:xfrm>
+            <a:off x="9051078" y="4817210"/>
+            <a:ext cx="697187" cy="697187"/>
+          </a:xfrm>
+          <a:prstGeom prst="rect">
+            <a:avLst/>
+          </a:prstGeom>
+        </p:spPr>
+      </p:pic>
+      <p:sp>
+        <p:nvSpPr>
+          <p:cNvPr id="62" name="Rectangle 61">
+            <a:extLst>
+              <a:ext uri="{FF2B5EF4-FFF2-40B4-BE49-F238E27FC236}">
+                <a16:creationId xmlns:a16="http://schemas.microsoft.com/office/drawing/2014/main" id="{D479E31F-6002-4AB2-8260-1EDA9DFA1853}"/>
+              </a:ext>
+            </a:extLst>
+          </p:cNvPr>
+          <p:cNvSpPr/>
+          <p:nvPr/>
+        </p:nvSpPr>
+        <p:spPr>
+          <a:xfrm>
+            <a:off x="581779" y="4696038"/>
+            <a:ext cx="1961585" cy="2081285"/>
+          </a:xfrm>
+          <a:prstGeom prst="rect">
+            <a:avLst/>
+          </a:prstGeom>
+        </p:spPr>
+        <p:style>
+          <a:lnRef idx="2">
+            <a:schemeClr val="accent2"/>
+          </a:lnRef>
+          <a:fillRef idx="1">
+            <a:schemeClr val="lt1"/>
+          </a:fillRef>
+          <a:effectRef idx="0">
+            <a:schemeClr val="accent2"/>
+          </a:effectRef>
+          <a:fontRef idx="minor">
+            <a:schemeClr val="dk1"/>
+          </a:fontRef>
+        </p:style>
+        <p:txBody>
+          <a:bodyPr rtlCol="0" anchor="ctr"/>
+          <a:lstStyle/>
+          <a:p>
+            <a:pPr algn="ctr"/>
+            <a:endParaRPr lang="en-US"/>
+          </a:p>
+        </p:txBody>
+      </p:sp>
+      <p:pic>
+        <p:nvPicPr>
+          <p:cNvPr id="66" name="Picture 65">
+            <a:extLst>
+              <a:ext uri="{FF2B5EF4-FFF2-40B4-BE49-F238E27FC236}">
+                <a16:creationId xmlns:a16="http://schemas.microsoft.com/office/drawing/2014/main" id="{B2F31721-DD80-4EF6-9A0E-0A7A07427837}"/>
+              </a:ext>
+            </a:extLst>
+          </p:cNvPr>
+          <p:cNvPicPr>
+            <a:picLocks noChangeAspect="1"/>
+          </p:cNvPicPr>
+          <p:nvPr/>
+        </p:nvPicPr>
+        <p:blipFill>
+          <a:blip r:embed="rId10">
+            <a:extLst>
+              <a:ext uri="{28A0092B-C50C-407E-A947-70E740481C1C}">
+                <a14:useLocalDpi xmlns:a14="http://schemas.microsoft.com/office/drawing/2010/main" val="0"/>
+              </a:ext>
+            </a:extLst>
+          </a:blip>
+          <a:stretch>
+            <a:fillRect/>
+          </a:stretch>
+        </p:blipFill>
+        <p:spPr>
+          <a:xfrm>
+            <a:off x="1037751" y="5169324"/>
+            <a:ext cx="1049639" cy="1049639"/>
+          </a:xfrm>
+          <a:prstGeom prst="rect">
+            <a:avLst/>
+          </a:prstGeom>
+        </p:spPr>
+      </p:pic>
+      <p:pic>
+        <p:nvPicPr>
+          <p:cNvPr id="68" name="Picture 67">
+            <a:extLst>
+              <a:ext uri="{FF2B5EF4-FFF2-40B4-BE49-F238E27FC236}">
+                <a16:creationId xmlns:a16="http://schemas.microsoft.com/office/drawing/2014/main" id="{3D0554FC-7CE2-47A5-821F-8688C8D16216}"/>
+              </a:ext>
+            </a:extLst>
+          </p:cNvPr>
+          <p:cNvPicPr>
+            <a:picLocks noChangeAspect="1"/>
+          </p:cNvPicPr>
+          <p:nvPr/>
+        </p:nvPicPr>
+        <p:blipFill>
+          <a:blip r:embed="rId11">
+            <a:extLst>
+              <a:ext uri="{28A0092B-C50C-407E-A947-70E740481C1C}">
+                <a14:useLocalDpi xmlns:a14="http://schemas.microsoft.com/office/drawing/2010/main" val="0"/>
+              </a:ext>
+            </a:extLst>
+          </a:blip>
+          <a:stretch>
+            <a:fillRect/>
+          </a:stretch>
+        </p:blipFill>
+        <p:spPr>
+          <a:xfrm>
+            <a:off x="5708789" y="5769544"/>
+            <a:ext cx="500605" cy="500605"/>
+          </a:xfrm>
+          <a:prstGeom prst="rect">
+            <a:avLst/>
+          </a:prstGeom>
+        </p:spPr>
+      </p:pic>
+      <p:pic>
+        <p:nvPicPr>
+          <p:cNvPr id="69" name="Picture 68">
+            <a:extLst>
+              <a:ext uri="{FF2B5EF4-FFF2-40B4-BE49-F238E27FC236}">
+                <a16:creationId xmlns:a16="http://schemas.microsoft.com/office/drawing/2014/main" id="{54BCABE1-2478-46E7-A73E-553F0358E05B}"/>
+              </a:ext>
+            </a:extLst>
+          </p:cNvPr>
+          <p:cNvPicPr>
+            <a:picLocks noChangeAspect="1"/>
+          </p:cNvPicPr>
+          <p:nvPr/>
+        </p:nvPicPr>
+        <p:blipFill>
+          <a:blip r:embed="rId12">
+            <a:extLst>
+              <a:ext uri="{28A0092B-C50C-407E-A947-70E740481C1C}">
+                <a14:useLocalDpi xmlns:a14="http://schemas.microsoft.com/office/drawing/2010/main" val="0"/>
+              </a:ext>
+            </a:extLst>
+          </a:blip>
+          <a:stretch>
+            <a:fillRect/>
+          </a:stretch>
+        </p:blipFill>
+        <p:spPr>
+          <a:xfrm>
+            <a:off x="6660023" y="5769544"/>
+            <a:ext cx="603376" cy="603376"/>
+          </a:xfrm>
+          <a:prstGeom prst="rect">
+            <a:avLst/>
+          </a:prstGeom>
+        </p:spPr>
+      </p:pic>
+      <p:pic>
+        <p:nvPicPr>
+          <p:cNvPr id="70" name="Picture 69">
+            <a:extLst>
+              <a:ext uri="{FF2B5EF4-FFF2-40B4-BE49-F238E27FC236}">
+                <a16:creationId xmlns:a16="http://schemas.microsoft.com/office/drawing/2014/main" id="{765A52F5-B5FB-43A2-9A50-6ED95DEEEAA4}"/>
+              </a:ext>
+            </a:extLst>
+          </p:cNvPr>
+          <p:cNvPicPr>
+            <a:picLocks noChangeAspect="1"/>
+          </p:cNvPicPr>
+          <p:nvPr/>
+        </p:nvPicPr>
+        <p:blipFill>
+          <a:blip r:embed="rId5">
+            <a:extLst>
+              <a:ext uri="{28A0092B-C50C-407E-A947-70E740481C1C}">
+                <a14:useLocalDpi xmlns:a14="http://schemas.microsoft.com/office/drawing/2010/main" val="0"/>
+              </a:ext>
+            </a:extLst>
+          </a:blip>
+          <a:stretch>
+            <a:fillRect/>
+          </a:stretch>
+        </p:blipFill>
+        <p:spPr>
+          <a:xfrm>
+            <a:off x="8489677" y="5769544"/>
+            <a:ext cx="770531" cy="583357"/>
+          </a:xfrm>
+          <a:prstGeom prst="rect">
+            <a:avLst/>
+          </a:prstGeom>
+        </p:spPr>
+      </p:pic>
+      <p:sp>
+        <p:nvSpPr>
+          <p:cNvPr id="71" name="TextBox 70">
+            <a:extLst>
+              <a:ext uri="{FF2B5EF4-FFF2-40B4-BE49-F238E27FC236}">
+                <a16:creationId xmlns:a16="http://schemas.microsoft.com/office/drawing/2014/main" id="{0F28C666-5D19-4D58-B11C-181DE162A30C}"/>
+              </a:ext>
+            </a:extLst>
+          </p:cNvPr>
+          <p:cNvSpPr txBox="1"/>
+          <p:nvPr/>
+        </p:nvSpPr>
+        <p:spPr>
+          <a:xfrm>
+            <a:off x="581779" y="6567210"/>
+            <a:ext cx="2288110" cy="276999"/>
+          </a:xfrm>
+          <a:prstGeom prst="rect">
+            <a:avLst/>
+          </a:prstGeom>
+          <a:noFill/>
+        </p:spPr>
+        <p:txBody>
+          <a:bodyPr wrap="square" rtlCol="0">
+            <a:spAutoFit/>
+          </a:bodyPr>
+          <a:lstStyle/>
+          <a:p>
+            <a:r>
+              <a:rPr lang="en-US" sz="1200" b="1" dirty="0">
+                <a:solidFill>
+                  <a:schemeClr val="accent2"/>
+                </a:solidFill>
+                <a:latin typeface="Segoe UI Light" panose="020B0502040204020203" pitchFamily="34" charset="0"/>
+                <a:cs typeface="Segoe UI Light" panose="020B0502040204020203" pitchFamily="34" charset="0"/>
+              </a:rPr>
+              <a:t>Notification Microservice</a:t>
+            </a:r>
+          </a:p>
+        </p:txBody>
+      </p:sp>
+      <p:sp>
+        <p:nvSpPr>
+          <p:cNvPr id="72" name="TextBox 71">
+            <a:extLst>
+              <a:ext uri="{FF2B5EF4-FFF2-40B4-BE49-F238E27FC236}">
+                <a16:creationId xmlns:a16="http://schemas.microsoft.com/office/drawing/2014/main" id="{BDD3024D-01A7-4A82-8932-92570EAE8791}"/>
+              </a:ext>
+            </a:extLst>
+          </p:cNvPr>
+          <p:cNvSpPr txBox="1"/>
+          <p:nvPr/>
+        </p:nvSpPr>
+        <p:spPr>
+          <a:xfrm>
+            <a:off x="2999767" y="6567210"/>
+            <a:ext cx="2288110" cy="276999"/>
+          </a:xfrm>
+          <a:prstGeom prst="rect">
+            <a:avLst/>
+          </a:prstGeom>
+          <a:noFill/>
+        </p:spPr>
+        <p:txBody>
+          <a:bodyPr wrap="square" rtlCol="0">
+            <a:spAutoFit/>
+          </a:bodyPr>
+          <a:lstStyle/>
+          <a:p>
+            <a:r>
+              <a:rPr lang="en-US" sz="1200" b="1" dirty="0">
+                <a:solidFill>
+                  <a:schemeClr val="accent2"/>
+                </a:solidFill>
+                <a:latin typeface="Segoe UI Light" panose="020B0502040204020203" pitchFamily="34" charset="0"/>
+                <a:cs typeface="Segoe UI Light" panose="020B0502040204020203" pitchFamily="34" charset="0"/>
+              </a:rPr>
+              <a:t>SignalR Handler Microservice</a:t>
+            </a:r>
+          </a:p>
+        </p:txBody>
+      </p:sp>
+      <p:sp>
+        <p:nvSpPr>
+          <p:cNvPr id="73" name="TextBox 72">
+            <a:extLst>
+              <a:ext uri="{FF2B5EF4-FFF2-40B4-BE49-F238E27FC236}">
+                <a16:creationId xmlns:a16="http://schemas.microsoft.com/office/drawing/2014/main" id="{B07F96C0-52DF-4E67-AC1E-E70A48378B6D}"/>
+              </a:ext>
+            </a:extLst>
+          </p:cNvPr>
+          <p:cNvSpPr txBox="1"/>
+          <p:nvPr/>
+        </p:nvSpPr>
+        <p:spPr>
+          <a:xfrm>
+            <a:off x="5404468" y="6567210"/>
+            <a:ext cx="2288110" cy="276999"/>
+          </a:xfrm>
+          <a:prstGeom prst="rect">
+            <a:avLst/>
+          </a:prstGeom>
+          <a:noFill/>
+        </p:spPr>
+        <p:txBody>
+          <a:bodyPr wrap="square" rtlCol="0">
+            <a:spAutoFit/>
+          </a:bodyPr>
+          <a:lstStyle/>
+          <a:p>
+            <a:r>
+              <a:rPr lang="en-US" sz="1200" b="1" dirty="0">
+                <a:solidFill>
+                  <a:schemeClr val="accent2"/>
+                </a:solidFill>
+                <a:latin typeface="Segoe UI Light" panose="020B0502040204020203" pitchFamily="34" charset="0"/>
+                <a:cs typeface="Segoe UI Light" panose="020B0502040204020203" pitchFamily="34" charset="0"/>
+              </a:rPr>
+              <a:t>PowerBI Handler Microservice</a:t>
+            </a:r>
+          </a:p>
+        </p:txBody>
+      </p:sp>
+      <p:sp>
+        <p:nvSpPr>
+          <p:cNvPr id="74" name="TextBox 73">
+            <a:extLst>
+              <a:ext uri="{FF2B5EF4-FFF2-40B4-BE49-F238E27FC236}">
+                <a16:creationId xmlns:a16="http://schemas.microsoft.com/office/drawing/2014/main" id="{59DEC83B-AE64-4248-9AD1-49F3FE6DCF8B}"/>
+              </a:ext>
+            </a:extLst>
+          </p:cNvPr>
+          <p:cNvSpPr txBox="1"/>
+          <p:nvPr/>
+        </p:nvSpPr>
+        <p:spPr>
+          <a:xfrm>
+            <a:off x="7802310" y="6567210"/>
+            <a:ext cx="2288110" cy="276999"/>
+          </a:xfrm>
+          <a:prstGeom prst="rect">
+            <a:avLst/>
+          </a:prstGeom>
+          <a:noFill/>
+        </p:spPr>
+        <p:txBody>
+          <a:bodyPr wrap="square" rtlCol="0">
+            <a:spAutoFit/>
+          </a:bodyPr>
+          <a:lstStyle/>
+          <a:p>
+            <a:r>
+              <a:rPr lang="en-US" sz="1200" b="1" dirty="0">
+                <a:solidFill>
+                  <a:schemeClr val="accent2"/>
+                </a:solidFill>
+                <a:latin typeface="Segoe UI Light" panose="020B0502040204020203" pitchFamily="34" charset="0"/>
+                <a:cs typeface="Segoe UI Light" panose="020B0502040204020203" pitchFamily="34" charset="0"/>
+              </a:rPr>
+              <a:t>Archiver Handler Microservice</a:t>
+            </a:r>
+          </a:p>
+        </p:txBody>
+      </p:sp>
+      <p:cxnSp>
+        <p:nvCxnSpPr>
+          <p:cNvPr id="76" name="Connector: Elbow 75">
+            <a:extLst>
+              <a:ext uri="{FF2B5EF4-FFF2-40B4-BE49-F238E27FC236}">
+                <a16:creationId xmlns:a16="http://schemas.microsoft.com/office/drawing/2014/main" id="{56E9ACCB-C193-4D2F-B9C2-9BB0E5641813}"/>
+              </a:ext>
+            </a:extLst>
+          </p:cNvPr>
+          <p:cNvCxnSpPr>
+            <a:stCxn id="2" idx="3"/>
+            <a:endCxn id="6" idx="1"/>
+          </p:cNvCxnSpPr>
+          <p:nvPr/>
+        </p:nvCxnSpPr>
+        <p:spPr>
+          <a:xfrm flipV="1">
+            <a:off x="2971802" y="571505"/>
+            <a:ext cx="466169" cy="1071291"/>
+          </a:xfrm>
+          <a:prstGeom prst="bentConnector3">
+            <a:avLst/>
+          </a:prstGeom>
+          <a:ln w="12700">
+            <a:headEnd type="triangle"/>
+            <a:tailEnd type="triangle"/>
+          </a:ln>
+        </p:spPr>
+        <p:style>
+          <a:lnRef idx="1">
+            <a:schemeClr val="accent1"/>
+          </a:lnRef>
+          <a:fillRef idx="0">
+            <a:schemeClr val="accent1"/>
+          </a:fillRef>
+          <a:effectRef idx="0">
+            <a:schemeClr val="accent1"/>
+          </a:effectRef>
+          <a:fontRef idx="minor">
+            <a:schemeClr val="tx1"/>
+          </a:fontRef>
+        </p:style>
+      </p:cxnSp>
+      <p:cxnSp>
+        <p:nvCxnSpPr>
+          <p:cNvPr id="78" name="Connector: Elbow 77">
+            <a:extLst>
+              <a:ext uri="{FF2B5EF4-FFF2-40B4-BE49-F238E27FC236}">
+                <a16:creationId xmlns:a16="http://schemas.microsoft.com/office/drawing/2014/main" id="{DDA8FAA7-F927-463F-B544-388F299AB8C3}"/>
+              </a:ext>
+            </a:extLst>
+          </p:cNvPr>
+          <p:cNvCxnSpPr>
+            <a:stCxn id="2" idx="3"/>
+            <a:endCxn id="39" idx="1"/>
+          </p:cNvCxnSpPr>
+          <p:nvPr/>
+        </p:nvCxnSpPr>
+        <p:spPr>
+          <a:xfrm>
+            <a:off x="2971802" y="1642796"/>
+            <a:ext cx="466169" cy="1092601"/>
+          </a:xfrm>
+          <a:prstGeom prst="bentConnector3">
+            <a:avLst/>
+          </a:prstGeom>
+          <a:ln w="12700">
+            <a:headEnd type="triangle"/>
+            <a:tailEnd type="triangle"/>
+          </a:ln>
+        </p:spPr>
+        <p:style>
+          <a:lnRef idx="1">
+            <a:schemeClr val="accent1"/>
+          </a:lnRef>
+          <a:fillRef idx="0">
+            <a:schemeClr val="accent1"/>
+          </a:fillRef>
+          <a:effectRef idx="0">
+            <a:schemeClr val="accent1"/>
+          </a:effectRef>
+          <a:fontRef idx="minor">
+            <a:schemeClr val="tx1"/>
+          </a:fontRef>
+        </p:style>
+      </p:cxnSp>
+      <p:cxnSp>
+        <p:nvCxnSpPr>
+          <p:cNvPr id="80" name="Connector: Elbow 79">
+            <a:extLst>
+              <a:ext uri="{FF2B5EF4-FFF2-40B4-BE49-F238E27FC236}">
+                <a16:creationId xmlns:a16="http://schemas.microsoft.com/office/drawing/2014/main" id="{AC117495-1F2C-42D8-A2B3-0C9D37386E9C}"/>
+              </a:ext>
+            </a:extLst>
+          </p:cNvPr>
+          <p:cNvCxnSpPr>
+            <a:stCxn id="2" idx="3"/>
+            <a:endCxn id="11" idx="1"/>
+          </p:cNvCxnSpPr>
+          <p:nvPr/>
+        </p:nvCxnSpPr>
+        <p:spPr>
+          <a:xfrm>
+            <a:off x="2971802" y="1642796"/>
+            <a:ext cx="466169" cy="5"/>
+          </a:xfrm>
+          <a:prstGeom prst="bentConnector3">
+            <a:avLst/>
+          </a:prstGeom>
+          <a:ln w="12700">
+            <a:headEnd type="triangle"/>
+            <a:tailEnd type="triangle"/>
+          </a:ln>
+        </p:spPr>
+        <p:style>
+          <a:lnRef idx="1">
+            <a:schemeClr val="accent1"/>
+          </a:lnRef>
+          <a:fillRef idx="0">
+            <a:schemeClr val="accent1"/>
+          </a:fillRef>
+          <a:effectRef idx="0">
+            <a:schemeClr val="accent1"/>
+          </a:effectRef>
+          <a:fontRef idx="minor">
+            <a:schemeClr val="tx1"/>
+          </a:fontRef>
+        </p:style>
+      </p:cxnSp>
+      <p:cxnSp>
+        <p:nvCxnSpPr>
+          <p:cNvPr id="82" name="Straight Arrow Connector 81">
+            <a:extLst>
+              <a:ext uri="{FF2B5EF4-FFF2-40B4-BE49-F238E27FC236}">
+                <a16:creationId xmlns:a16="http://schemas.microsoft.com/office/drawing/2014/main" id="{25E4BDA7-2A18-4370-A84D-B8AC52AC27C0}"/>
+              </a:ext>
+            </a:extLst>
+          </p:cNvPr>
+          <p:cNvCxnSpPr>
+            <a:stCxn id="11" idx="3"/>
+            <a:endCxn id="15" idx="1"/>
+          </p:cNvCxnSpPr>
+          <p:nvPr/>
+        </p:nvCxnSpPr>
+        <p:spPr>
+          <a:xfrm>
+            <a:off x="7463123" y="1642801"/>
+            <a:ext cx="390551" cy="1954"/>
+          </a:xfrm>
+          <a:prstGeom prst="straightConnector1">
+            <a:avLst/>
+          </a:prstGeom>
+          <a:ln>
+            <a:solidFill>
+              <a:schemeClr val="accent6">
+                <a:lumMod val="75000"/>
+              </a:schemeClr>
+            </a:solidFill>
+            <a:tailEnd type="triangle"/>
+          </a:ln>
+        </p:spPr>
+        <p:style>
+          <a:lnRef idx="1">
+            <a:schemeClr val="accent1"/>
+          </a:lnRef>
+          <a:fillRef idx="0">
+            <a:schemeClr val="accent1"/>
+          </a:fillRef>
+          <a:effectRef idx="0">
+            <a:schemeClr val="accent1"/>
+          </a:effectRef>
+          <a:fontRef idx="minor">
+            <a:schemeClr val="tx1"/>
+          </a:fontRef>
+        </p:style>
+      </p:cxnSp>
+      <p:cxnSp>
+        <p:nvCxnSpPr>
+          <p:cNvPr id="84" name="Connector: Elbow 83">
+            <a:extLst>
+              <a:ext uri="{FF2B5EF4-FFF2-40B4-BE49-F238E27FC236}">
+                <a16:creationId xmlns:a16="http://schemas.microsoft.com/office/drawing/2014/main" id="{D08DEA6B-1E70-49B4-8F2F-A2E1499A6816}"/>
+              </a:ext>
+            </a:extLst>
+          </p:cNvPr>
+          <p:cNvCxnSpPr>
+            <a:cxnSpLocks/>
+            <a:endCxn id="19" idx="3"/>
+          </p:cNvCxnSpPr>
+          <p:nvPr/>
+        </p:nvCxnSpPr>
+        <p:spPr>
+          <a:xfrm rot="10800000" flipV="1">
+            <a:off x="5893499" y="2128913"/>
+            <a:ext cx="3932769" cy="1745060"/>
+          </a:xfrm>
+          <a:prstGeom prst="bentConnector3">
+            <a:avLst>
+              <a:gd name="adj1" fmla="val 79"/>
+            </a:avLst>
+          </a:prstGeom>
+          <a:ln w="12700">
+            <a:tailEnd type="triangle"/>
+          </a:ln>
+        </p:spPr>
+        <p:style>
+          <a:lnRef idx="1">
+            <a:schemeClr val="accent1"/>
+          </a:lnRef>
+          <a:fillRef idx="0">
+            <a:schemeClr val="accent1"/>
+          </a:fillRef>
+          <a:effectRef idx="0">
+            <a:schemeClr val="accent1"/>
+          </a:effectRef>
+          <a:fontRef idx="minor">
+            <a:schemeClr val="tx1"/>
+          </a:fontRef>
+        </p:style>
+      </p:cxnSp>
+      <p:cxnSp>
+        <p:nvCxnSpPr>
+          <p:cNvPr id="93" name="Connector: Elbow 92">
+            <a:extLst>
+              <a:ext uri="{FF2B5EF4-FFF2-40B4-BE49-F238E27FC236}">
+                <a16:creationId xmlns:a16="http://schemas.microsoft.com/office/drawing/2014/main" id="{B6243A1C-E4B7-458C-BD1C-4163F2FCD06D}"/>
+              </a:ext>
+            </a:extLst>
+          </p:cNvPr>
+          <p:cNvCxnSpPr>
+            <a:stCxn id="19" idx="2"/>
+            <a:endCxn id="57" idx="0"/>
+          </p:cNvCxnSpPr>
+          <p:nvPr/>
+        </p:nvCxnSpPr>
+        <p:spPr>
+          <a:xfrm rot="16200000" flipH="1">
+            <a:off x="6961277" y="2811840"/>
+            <a:ext cx="327388" cy="3441007"/>
+          </a:xfrm>
+          <a:prstGeom prst="bentConnector3">
+            <a:avLst/>
+          </a:prstGeom>
+          <a:ln w="12700">
+            <a:solidFill>
+              <a:schemeClr val="accent2"/>
+            </a:solidFill>
+            <a:tailEnd type="triangle"/>
+          </a:ln>
+        </p:spPr>
+        <p:style>
+          <a:lnRef idx="1">
+            <a:schemeClr val="accent1"/>
+          </a:lnRef>
+          <a:fillRef idx="0">
+            <a:schemeClr val="accent1"/>
+          </a:fillRef>
+          <a:effectRef idx="0">
+            <a:schemeClr val="accent1"/>
+          </a:effectRef>
+          <a:fontRef idx="minor">
+            <a:schemeClr val="tx1"/>
+          </a:fontRef>
+        </p:style>
+      </p:cxnSp>
+      <p:cxnSp>
+        <p:nvCxnSpPr>
+          <p:cNvPr id="95" name="Connector: Elbow 94">
+            <a:extLst>
+              <a:ext uri="{FF2B5EF4-FFF2-40B4-BE49-F238E27FC236}">
+                <a16:creationId xmlns:a16="http://schemas.microsoft.com/office/drawing/2014/main" id="{BCFD0A14-E684-443D-896C-40870C040C2E}"/>
+              </a:ext>
+            </a:extLst>
+          </p:cNvPr>
+          <p:cNvCxnSpPr>
+            <a:cxnSpLocks/>
+          </p:cNvCxnSpPr>
+          <p:nvPr/>
+        </p:nvCxnSpPr>
+        <p:spPr>
+          <a:xfrm rot="16200000" flipH="1">
+            <a:off x="5751103" y="4035304"/>
+            <a:ext cx="327388" cy="994081"/>
+          </a:xfrm>
+          <a:prstGeom prst="bentConnector3">
+            <a:avLst/>
+          </a:prstGeom>
+          <a:ln w="12700">
+            <a:solidFill>
+              <a:schemeClr val="accent2"/>
+            </a:solidFill>
+            <a:tailEnd type="triangle"/>
+          </a:ln>
+        </p:spPr>
+        <p:style>
+          <a:lnRef idx="1">
+            <a:schemeClr val="accent1"/>
+          </a:lnRef>
+          <a:fillRef idx="0">
+            <a:schemeClr val="accent1"/>
+          </a:fillRef>
+          <a:effectRef idx="0">
+            <a:schemeClr val="accent1"/>
+          </a:effectRef>
+          <a:fontRef idx="minor">
+            <a:schemeClr val="tx1"/>
+          </a:fontRef>
+        </p:style>
+      </p:cxnSp>
+      <p:cxnSp>
+        <p:nvCxnSpPr>
+          <p:cNvPr id="99" name="Connector: Elbow 98">
+            <a:extLst>
+              <a:ext uri="{FF2B5EF4-FFF2-40B4-BE49-F238E27FC236}">
+                <a16:creationId xmlns:a16="http://schemas.microsoft.com/office/drawing/2014/main" id="{8DD53BB6-1770-4E26-8F06-7BDDAD724BAB}"/>
+              </a:ext>
+            </a:extLst>
+          </p:cNvPr>
+          <p:cNvCxnSpPr>
+            <a:cxnSpLocks/>
+          </p:cNvCxnSpPr>
+          <p:nvPr/>
+        </p:nvCxnSpPr>
+        <p:spPr>
+          <a:xfrm rot="5400000">
+            <a:off x="3333115" y="2611397"/>
+            <a:ext cx="327388" cy="3841896"/>
+          </a:xfrm>
+          <a:prstGeom prst="bentConnector3">
+            <a:avLst/>
+          </a:prstGeom>
+          <a:ln w="12700">
+            <a:solidFill>
+              <a:schemeClr val="accent2"/>
+            </a:solidFill>
+            <a:tailEnd type="triangle"/>
+          </a:ln>
+        </p:spPr>
+        <p:style>
+          <a:lnRef idx="1">
+            <a:schemeClr val="accent1"/>
+          </a:lnRef>
+          <a:fillRef idx="0">
+            <a:schemeClr val="accent1"/>
+          </a:fillRef>
+          <a:effectRef idx="0">
+            <a:schemeClr val="accent1"/>
+          </a:effectRef>
+          <a:fontRef idx="minor">
+            <a:schemeClr val="tx1"/>
+          </a:fontRef>
+        </p:style>
+      </p:cxnSp>
+      <p:cxnSp>
+        <p:nvCxnSpPr>
+          <p:cNvPr id="101" name="Connector: Elbow 100">
+            <a:extLst>
+              <a:ext uri="{FF2B5EF4-FFF2-40B4-BE49-F238E27FC236}">
+                <a16:creationId xmlns:a16="http://schemas.microsoft.com/office/drawing/2014/main" id="{06833FC5-3C7B-4EBB-8FC0-6EA91C7CBA98}"/>
+              </a:ext>
+            </a:extLst>
+          </p:cNvPr>
+          <p:cNvCxnSpPr>
+            <a:cxnSpLocks/>
+          </p:cNvCxnSpPr>
+          <p:nvPr/>
+        </p:nvCxnSpPr>
+        <p:spPr>
+          <a:xfrm rot="5400000">
+            <a:off x="4553811" y="3832093"/>
+            <a:ext cx="327388" cy="1400505"/>
+          </a:xfrm>
+          <a:prstGeom prst="bentConnector3">
+            <a:avLst/>
+          </a:prstGeom>
+          <a:ln w="12700">
+            <a:solidFill>
+              <a:schemeClr val="accent2"/>
+            </a:solidFill>
+            <a:tailEnd type="triangle"/>
+          </a:ln>
+        </p:spPr>
+        <p:style>
+          <a:lnRef idx="1">
+            <a:schemeClr val="accent1"/>
+          </a:lnRef>
+          <a:fillRef idx="0">
+            <a:schemeClr val="accent1"/>
+          </a:fillRef>
+          <a:effectRef idx="0">
+            <a:schemeClr val="accent1"/>
+          </a:effectRef>
+          <a:fontRef idx="minor">
+            <a:schemeClr val="tx1"/>
+          </a:fontRef>
+        </p:style>
+      </p:cxnSp>
+      <p:pic>
+        <p:nvPicPr>
+          <p:cNvPr id="105" name="Picture 104">
+            <a:extLst>
+              <a:ext uri="{FF2B5EF4-FFF2-40B4-BE49-F238E27FC236}">
+                <a16:creationId xmlns:a16="http://schemas.microsoft.com/office/drawing/2014/main" id="{BB323913-39C7-43E9-9C87-6734966E4B1B}"/>
+              </a:ext>
+            </a:extLst>
+          </p:cNvPr>
+          <p:cNvPicPr>
+            <a:picLocks noChangeAspect="1"/>
+          </p:cNvPicPr>
+          <p:nvPr/>
+        </p:nvPicPr>
+        <p:blipFill>
+          <a:blip r:embed="rId13">
+            <a:extLst>
+              <a:ext uri="{28A0092B-C50C-407E-A947-70E740481C1C}">
+                <a14:useLocalDpi xmlns:a14="http://schemas.microsoft.com/office/drawing/2010/main" val="0"/>
+              </a:ext>
+            </a:extLst>
+          </a:blip>
+          <a:stretch>
+            <a:fillRect/>
+          </a:stretch>
+        </p:blipFill>
+        <p:spPr>
+          <a:xfrm>
+            <a:off x="3595516" y="5577093"/>
+            <a:ext cx="806602" cy="862978"/>
+          </a:xfrm>
+          <a:prstGeom prst="rect">
+            <a:avLst/>
+          </a:prstGeom>
+        </p:spPr>
+      </p:pic>
+    </p:spTree>
+    <p:extLst>
+      <p:ext uri="{BB962C8B-B14F-4D97-AF65-F5344CB8AC3E}">
+        <p14:creationId xmlns:p14="http://schemas.microsoft.com/office/powerpoint/2010/main" val="2547119592"/>
+      </p:ext>
+    </p:extLst>
+  </p:cSld>
+  <p:clrMapOvr>
+    <a:masterClrMapping/>
+  </p:clrMapOvr>
+</p:sld>
+</file>
+
 <file path=ppt/theme/theme1.xml><?xml version="1.0" encoding="utf-8"?>
 <a:theme xmlns:a="http://schemas.openxmlformats.org/drawingml/2006/main" name="Office Theme">
   <a:themeElements>

</xml_diff>